<commit_message>
added file to preprocess data for regression analysis
</commit_message>
<xml_diff>
--- a/Backend/Graphs/Making_Charts.pptx
+++ b/Backend/Graphs/Making_Charts.pptx
@@ -206,7 +206,7 @@
               <c:strCache>
                 <c:ptCount val="1"/>
                 <c:pt idx="0">
-                  <c:v>Original COVID Dataset </c:v>
+                  <c:v>Derivation COVID Dataset </c:v>
                 </c:pt>
               </c:strCache>
             </c:strRef>
@@ -259,29 +259,29 @@
                 <c:formatCode>General</c:formatCode>
                 <c:ptCount val="6"/>
                 <c:pt idx="0">
-                  <c:v>0.91213389121338917</c:v>
+                  <c:v>0.91631799163179917</c:v>
                 </c:pt>
                 <c:pt idx="1">
-                  <c:v>0.93442622950819676</c:v>
+                  <c:v>0.91803278688524592</c:v>
                 </c:pt>
                 <c:pt idx="2">
-                  <c:v>0.88888888888888884</c:v>
+                  <c:v>0.9145299145299145</c:v>
                 </c:pt>
                 <c:pt idx="3">
-                  <c:v>0.89763779527559051</c:v>
+                  <c:v>0.91803278688524592</c:v>
                 </c:pt>
                 <c:pt idx="4">
-                  <c:v>0.9285714285714286</c:v>
+                  <c:v>0.9145299145299145</c:v>
                 </c:pt>
                 <c:pt idx="5">
-                  <c:v>0.96321984026902063</c:v>
+                  <c:v>0.96763345943673806</c:v>
                 </c:pt>
               </c:numCache>
             </c:numRef>
           </c:val>
           <c:extLst>
             <c:ext xmlns:c16="http://schemas.microsoft.com/office/drawing/2014/chart" uri="{C3380CC4-5D6E-409C-BE32-E72D297353CC}">
-              <c16:uniqueId val="{00000000-08AB-A040-B627-35B67E24976A}"/>
+              <c16:uniqueId val="{00000000-5F85-5045-BA0D-77A60FB254BE}"/>
             </c:ext>
           </c:extLst>
         </c:ser>
@@ -294,7 +294,7 @@
               <c:strCache>
                 <c:ptCount val="1"/>
                 <c:pt idx="0">
-                  <c:v>Unseen COVID Dataset</c:v>
+                  <c:v>Validation COVID Dataset</c:v>
                 </c:pt>
               </c:strCache>
             </c:strRef>
@@ -347,29 +347,29 @@
                 <c:formatCode>General</c:formatCode>
                 <c:ptCount val="6"/>
                 <c:pt idx="0">
-                  <c:v>0.85185185185185186</c:v>
+                  <c:v>0.85771543086172342</c:v>
                 </c:pt>
                 <c:pt idx="1">
                   <c:v>0.83333333333333337</c:v>
                 </c:pt>
                 <c:pt idx="2">
-                  <c:v>0.87037037037037035</c:v>
+                  <c:v>0.86445012787723785</c:v>
                 </c:pt>
                 <c:pt idx="3">
-                  <c:v>0.86538461538461542</c:v>
+                  <c:v>0.62937062937062938</c:v>
                 </c:pt>
                 <c:pt idx="4">
-                  <c:v>0.8392857142857143</c:v>
+                  <c:v>0.949438202247191</c:v>
                 </c:pt>
                 <c:pt idx="5">
-                  <c:v>0.92147848079561046</c:v>
+                  <c:v>0.9186381074168799</c:v>
                 </c:pt>
               </c:numCache>
             </c:numRef>
           </c:val>
           <c:extLst>
             <c:ext xmlns:c16="http://schemas.microsoft.com/office/drawing/2014/chart" uri="{C3380CC4-5D6E-409C-BE32-E72D297353CC}">
-              <c16:uniqueId val="{00000001-08AB-A040-B627-35B67E24976A}"/>
+              <c16:uniqueId val="{00000001-5F85-5045-BA0D-77A60FB254BE}"/>
             </c:ext>
           </c:extLst>
         </c:ser>
@@ -435,29 +435,29 @@
                 <c:formatCode>General</c:formatCode>
                 <c:ptCount val="6"/>
                 <c:pt idx="0">
-                  <c:v>0.79245283018867929</c:v>
+                  <c:v>0.80762100000000003</c:v>
                 </c:pt>
                 <c:pt idx="1">
-                  <c:v>0.72641509433962259</c:v>
+                  <c:v>0.73584899999999998</c:v>
                 </c:pt>
                 <c:pt idx="2">
-                  <c:v>0.85849056603773588</c:v>
+                  <c:v>0.81546399999999997</c:v>
                 </c:pt>
                 <c:pt idx="3">
-                  <c:v>0.83695652173913049</c:v>
+                  <c:v>0.30350199999999999</c:v>
                 </c:pt>
                 <c:pt idx="4">
-                  <c:v>0.7583333333333333</c:v>
+                  <c:v>0.965812</c:v>
                 </c:pt>
                 <c:pt idx="5">
-                  <c:v>0.86124955500177991</c:v>
+                  <c:v>0.85955599999999999</c:v>
                 </c:pt>
               </c:numCache>
             </c:numRef>
           </c:val>
           <c:extLst>
             <c:ext xmlns:c16="http://schemas.microsoft.com/office/drawing/2014/chart" uri="{C3380CC4-5D6E-409C-BE32-E72D297353CC}">
-              <c16:uniqueId val="{00000002-08AB-A040-B627-35B67E24976A}"/>
+              <c16:uniqueId val="{00000002-5F85-5045-BA0D-77A60FB254BE}"/>
             </c:ext>
           </c:extLst>
         </c:ser>
@@ -514,29 +514,29 @@
                 <c:formatCode>General</c:formatCode>
                 <c:ptCount val="6"/>
                 <c:pt idx="0">
-                  <c:v>0.86324786324786329</c:v>
+                  <c:v>0.8289269051321928</c:v>
                 </c:pt>
                 <c:pt idx="1">
-                  <c:v>0.70833333333333337</c:v>
+                  <c:v>0.70491803278688525</c:v>
                 </c:pt>
                 <c:pt idx="2">
-                  <c:v>0.87461773700305812</c:v>
+                  <c:v>0.84192439862542956</c:v>
                 </c:pt>
                 <c:pt idx="3">
-                  <c:v>0.29310344827586199</c:v>
+                  <c:v>0.31851851851851848</c:v>
                 </c:pt>
                 <c:pt idx="4">
-                  <c:v>0.97610921501706482</c:v>
+                  <c:v>0.96456692913385822</c:v>
                 </c:pt>
                 <c:pt idx="5">
-                  <c:v>0.87812181447502546</c:v>
+                  <c:v>0.87285223367697595</c:v>
                 </c:pt>
               </c:numCache>
             </c:numRef>
           </c:val>
           <c:extLst>
             <c:ext xmlns:c16="http://schemas.microsoft.com/office/drawing/2014/chart" uri="{C3380CC4-5D6E-409C-BE32-E72D297353CC}">
-              <c16:uniqueId val="{00000003-08AB-A040-B627-35B67E24976A}"/>
+              <c16:uniqueId val="{00000003-5F85-5045-BA0D-77A60FB254BE}"/>
             </c:ext>
           </c:extLst>
         </c:ser>
@@ -656,8 +656,8 @@
             <c:manualLayout>
               <c:xMode val="edge"/>
               <c:yMode val="edge"/>
-              <c:x val="1.7598579182630902E-3"/>
-              <c:y val="0.40713808463251672"/>
+              <c:x val="9.362780334639019E-3"/>
+              <c:y val="0.40713804083807648"/>
             </c:manualLayout>
           </c:layout>
           <c:overlay val="0"/>
@@ -718,9 +718,9 @@
         <c:manualLayout>
           <c:xMode val="edge"/>
           <c:yMode val="edge"/>
-          <c:x val="0.67051125478927198"/>
+          <c:x val="0.71866338596870727"/>
           <c:y val="2.8314369099621595E-2"/>
-          <c:w val="0.28516922094508301"/>
+          <c:w val="0.23701708847069006"/>
           <c:h val="0.14555087299466088"/>
         </c:manualLayout>
       </c:layout>
@@ -865,7 +865,7 @@
               <c:strCache>
                 <c:ptCount val="1"/>
                 <c:pt idx="0">
-                  <c:v>Original COVID Dataset </c:v>
+                  <c:v>Derivation COVID Dataset </c:v>
                 </c:pt>
               </c:strCache>
             </c:strRef>
@@ -918,29 +918,29 @@
                 <c:formatCode>General</c:formatCode>
                 <c:ptCount val="6"/>
                 <c:pt idx="0">
-                  <c:v>0.89387755102040811</c:v>
+                  <c:v>0.88571428571428568</c:v>
                 </c:pt>
                 <c:pt idx="1">
                   <c:v>0.88793103448275867</c:v>
                 </c:pt>
                 <c:pt idx="2">
-                  <c:v>0.89922480620155043</c:v>
+                  <c:v>0.88372093023255816</c:v>
                 </c:pt>
                 <c:pt idx="3">
-                  <c:v>0.88793103448275867</c:v>
+                  <c:v>0.8728813559322034</c:v>
                 </c:pt>
                 <c:pt idx="4">
-                  <c:v>0.89922480620155043</c:v>
+                  <c:v>0.89763779527559051</c:v>
                 </c:pt>
                 <c:pt idx="5">
-                  <c:v>0.95382250735097562</c:v>
+                  <c:v>0.9556602512697141</c:v>
                 </c:pt>
               </c:numCache>
             </c:numRef>
           </c:val>
           <c:extLst>
             <c:ext xmlns:c16="http://schemas.microsoft.com/office/drawing/2014/chart" uri="{C3380CC4-5D6E-409C-BE32-E72D297353CC}">
-              <c16:uniqueId val="{00000000-3936-094E-B2E9-E8E9471FC019}"/>
+              <c16:uniqueId val="{00000000-DE73-8042-93F5-EB4355FA5621}"/>
             </c:ext>
           </c:extLst>
         </c:ser>
@@ -953,7 +953,7 @@
               <c:strCache>
                 <c:ptCount val="1"/>
                 <c:pt idx="0">
-                  <c:v>Unseen COVID Dataset</c:v>
+                  <c:v>Validation COVID Dataset</c:v>
                 </c:pt>
               </c:strCache>
             </c:strRef>
@@ -1006,29 +1006,29 @@
                 <c:formatCode>General</c:formatCode>
                 <c:ptCount val="6"/>
                 <c:pt idx="0">
-                  <c:v>0.86633663366336633</c:v>
+                  <c:v>0.8587174348697395</c:v>
                 </c:pt>
                 <c:pt idx="1">
-                  <c:v>0.83168316831683164</c:v>
+                  <c:v>0.82178217821782173</c:v>
                 </c:pt>
                 <c:pt idx="2">
-                  <c:v>0.90099009900990101</c:v>
+                  <c:v>0.86809045226130654</c:v>
                 </c:pt>
                 <c:pt idx="3">
-                  <c:v>0.8936170212765957</c:v>
+                  <c:v>0.61254612546125464</c:v>
                 </c:pt>
                 <c:pt idx="4">
-                  <c:v>0.84259259259259256</c:v>
+                  <c:v>0.95048143053645118</c:v>
                 </c:pt>
                 <c:pt idx="5">
-                  <c:v>0.93267816880697973</c:v>
+                  <c:v>0.92294703716602822</c:v>
                 </c:pt>
               </c:numCache>
             </c:numRef>
           </c:val>
           <c:extLst>
             <c:ext xmlns:c16="http://schemas.microsoft.com/office/drawing/2014/chart" uri="{C3380CC4-5D6E-409C-BE32-E72D297353CC}">
-              <c16:uniqueId val="{00000001-3936-094E-B2E9-E8E9471FC019}"/>
+              <c16:uniqueId val="{00000001-DE73-8042-93F5-EB4355FA5621}"/>
             </c:ext>
           </c:extLst>
         </c:ser>
@@ -1094,29 +1094,29 @@
                 <c:formatCode>General</c:formatCode>
                 <c:ptCount val="6"/>
                 <c:pt idx="0">
-                  <c:v>0.81862745098039214</c:v>
+                  <c:v>0.83178438661710041</c:v>
                 </c:pt>
                 <c:pt idx="1">
-                  <c:v>0.78431372549019607</c:v>
+                  <c:v>0.79411764705882348</c:v>
                 </c:pt>
                 <c:pt idx="2">
-                  <c:v>0.8529411764705882</c:v>
+                  <c:v>0.83572895277207393</c:v>
                 </c:pt>
                 <c:pt idx="3">
-                  <c:v>0.84210526315789469</c:v>
+                  <c:v>0.33609958506224069</c:v>
                 </c:pt>
                 <c:pt idx="4">
-                  <c:v>0.79816513761467889</c:v>
+                  <c:v>0.97485029940119761</c:v>
                 </c:pt>
                 <c:pt idx="5">
-                  <c:v>0.88715878508266055</c:v>
+                  <c:v>0.89641462334420419</c:v>
                 </c:pt>
               </c:numCache>
             </c:numRef>
           </c:val>
           <c:extLst>
             <c:ext xmlns:c16="http://schemas.microsoft.com/office/drawing/2014/chart" uri="{C3380CC4-5D6E-409C-BE32-E72D297353CC}">
-              <c16:uniqueId val="{00000002-3936-094E-B2E9-E8E9471FC019}"/>
+              <c16:uniqueId val="{00000002-DE73-8042-93F5-EB4355FA5621}"/>
             </c:ext>
           </c:extLst>
         </c:ser>
@@ -1173,29 +1173,29 @@
                 <c:formatCode>General</c:formatCode>
                 <c:ptCount val="6"/>
                 <c:pt idx="0">
-                  <c:v>0.86324800000000002</c:v>
+                  <c:v>0.84914463452566091</c:v>
                 </c:pt>
                 <c:pt idx="1">
-                  <c:v>0.631579</c:v>
+                  <c:v>0.72881355932203384</c:v>
                 </c:pt>
                 <c:pt idx="2">
-                  <c:v>0.87650600000000001</c:v>
+                  <c:v>0.86130136986301364</c:v>
                 </c:pt>
                 <c:pt idx="3">
-                  <c:v>0.22641500000000001</c:v>
+                  <c:v>0.34677419354838712</c:v>
                 </c:pt>
                 <c:pt idx="4">
-                  <c:v>0.97650999999999999</c:v>
+                  <c:v>0.96917148362235073</c:v>
                 </c:pt>
                 <c:pt idx="5">
-                  <c:v>0.85050700000000001</c:v>
+                  <c:v>0.86884722544694681</c:v>
                 </c:pt>
               </c:numCache>
             </c:numRef>
           </c:val>
           <c:extLst>
             <c:ext xmlns:c16="http://schemas.microsoft.com/office/drawing/2014/chart" uri="{C3380CC4-5D6E-409C-BE32-E72D297353CC}">
-              <c16:uniqueId val="{00000003-3936-094E-B2E9-E8E9471FC019}"/>
+              <c16:uniqueId val="{00000003-DE73-8042-93F5-EB4355FA5621}"/>
             </c:ext>
           </c:extLst>
         </c:ser>
@@ -1282,7 +1282,7 @@
                   </a:defRPr>
                 </a:pPr>
                 <a:r>
-                  <a:rPr lang="en-US" sz="1050" b="1" dirty="0">
+                  <a:rPr lang="en-US" sz="1050" b="1">
                     <a:solidFill>
                       <a:sysClr val="windowText" lastClr="000000"/>
                     </a:solidFill>
@@ -1292,7 +1292,7 @@
                   <a:t>Metric</a:t>
                 </a:r>
                 <a:r>
-                  <a:rPr lang="en-US" sz="1050" b="1" baseline="0" dirty="0">
+                  <a:rPr lang="en-US" sz="1050" b="1" baseline="0">
                     <a:solidFill>
                       <a:sysClr val="windowText" lastClr="000000"/>
                     </a:solidFill>
@@ -1301,7 +1301,7 @@
                   </a:rPr>
                   <a:t> Value</a:t>
                 </a:r>
-                <a:endParaRPr lang="en-US" sz="1050" b="1" dirty="0">
+                <a:endParaRPr lang="en-US" sz="1050" b="1">
                   <a:solidFill>
                     <a:sysClr val="windowText" lastClr="000000"/>
                   </a:solidFill>
@@ -1315,8 +1315,8 @@
             <c:manualLayout>
               <c:xMode val="edge"/>
               <c:yMode val="edge"/>
-              <c:x val="1.7598579182630902E-3"/>
-              <c:y val="0.40713808463251672"/>
+              <c:x val="9.362780334639019E-3"/>
+              <c:y val="0.40713804083807648"/>
             </c:manualLayout>
           </c:layout>
           <c:overlay val="0"/>
@@ -1377,9 +1377,9 @@
         <c:manualLayout>
           <c:xMode val="edge"/>
           <c:yMode val="edge"/>
-          <c:x val="0.67051125478927198"/>
+          <c:x val="0.71866338596870727"/>
           <c:y val="2.8314369099621595E-2"/>
-          <c:w val="0.28516922094508301"/>
+          <c:w val="0.23701708847069006"/>
           <c:h val="0.14555087299466088"/>
         </c:manualLayout>
       </c:layout>
@@ -1488,8 +1488,8 @@
           <c:layoutTarget val="inner"/>
           <c:xMode val="edge"/>
           <c:yMode val="edge"/>
-          <c:x val="8.2802927849122368E-2"/>
-          <c:y val="0.17484470958831355"/>
+          <c:x val="8.2802973593231355E-2"/>
+          <c:y val="0.17484459179444672"/>
           <c:w val="0.89999716824096054"/>
           <c:h val="0.77257167614813693"/>
         </c:manualLayout>
@@ -1507,7 +1507,7 @@
               <c:strCache>
                 <c:ptCount val="1"/>
                 <c:pt idx="0">
-                  <c:v>Original COVID Dataset </c:v>
+                  <c:v>Derivation COVID Dataset </c:v>
                 </c:pt>
               </c:strCache>
             </c:strRef>
@@ -1565,26 +1565,26 @@
                   <c:v>0.84375</c:v>
                 </c:pt>
                 <c:pt idx="1">
-                  <c:v>0.77419354838709675</c:v>
+                  <c:v>0.77419349999999998</c:v>
                 </c:pt>
                 <c:pt idx="2">
-                  <c:v>0.90909090909090906</c:v>
+                  <c:v>0.90909090000000004</c:v>
                 </c:pt>
                 <c:pt idx="3">
-                  <c:v>0.88888888888888884</c:v>
+                  <c:v>0.88888889999999998</c:v>
                 </c:pt>
                 <c:pt idx="4">
-                  <c:v>0.81081081081081086</c:v>
+                  <c:v>0.81081080000000005</c:v>
                 </c:pt>
                 <c:pt idx="5">
-                  <c:v>0.8944281524926686</c:v>
+                  <c:v>0.89442820000000001</c:v>
                 </c:pt>
               </c:numCache>
             </c:numRef>
           </c:val>
           <c:extLst>
             <c:ext xmlns:c16="http://schemas.microsoft.com/office/drawing/2014/chart" uri="{C3380CC4-5D6E-409C-BE32-E72D297353CC}">
-              <c16:uniqueId val="{00000000-5202-4148-9984-73503D82F1E3}"/>
+              <c16:uniqueId val="{00000000-3837-E341-91C2-5F12A1A5FE57}"/>
             </c:ext>
           </c:extLst>
         </c:ser>
@@ -1597,7 +1597,7 @@
               <c:strCache>
                 <c:ptCount val="1"/>
                 <c:pt idx="0">
-                  <c:v>Unseen COVID Dataset</c:v>
+                  <c:v>Validation COVID Dataset</c:v>
                 </c:pt>
               </c:strCache>
             </c:strRef>
@@ -1652,29 +1652,29 @@
                 <c:formatCode>General</c:formatCode>
                 <c:ptCount val="6"/>
                 <c:pt idx="0">
-                  <c:v>0.8257575757575758</c:v>
+                  <c:v>0.85599199999999998</c:v>
                 </c:pt>
                 <c:pt idx="1">
-                  <c:v>0.77272727272727271</c:v>
+                  <c:v>0.77272700000000005</c:v>
                 </c:pt>
                 <c:pt idx="2">
-                  <c:v>0.87878787878787878</c:v>
+                  <c:v>0.86192000000000002</c:v>
                 </c:pt>
                 <c:pt idx="3">
-                  <c:v>0.86440677966101698</c:v>
+                  <c:v>0.284916</c:v>
                 </c:pt>
                 <c:pt idx="4">
-                  <c:v>0.79452054794520544</c:v>
+                  <c:v>0.981572</c:v>
                 </c:pt>
                 <c:pt idx="5">
-                  <c:v>0.90909090909090906</c:v>
+                  <c:v>0.89683199999999996</c:v>
                 </c:pt>
               </c:numCache>
             </c:numRef>
           </c:val>
           <c:extLst>
             <c:ext xmlns:c16="http://schemas.microsoft.com/office/drawing/2014/chart" uri="{C3380CC4-5D6E-409C-BE32-E72D297353CC}">
-              <c16:uniqueId val="{00000001-5202-4148-9984-73503D82F1E3}"/>
+              <c16:uniqueId val="{00000001-3837-E341-91C2-5F12A1A5FE57}"/>
             </c:ext>
           </c:extLst>
         </c:ser>
@@ -1742,29 +1742,29 @@
                 <c:formatCode>General</c:formatCode>
                 <c:ptCount val="6"/>
                 <c:pt idx="0">
-                  <c:v>0.76923076923076927</c:v>
+                  <c:v>0.88411200000000001</c:v>
                 </c:pt>
                 <c:pt idx="1">
-                  <c:v>0.73076923076923073</c:v>
+                  <c:v>0.730769</c:v>
                 </c:pt>
                 <c:pt idx="2">
-                  <c:v>0.80769230769230771</c:v>
+                  <c:v>0.88793100000000003</c:v>
                 </c:pt>
                 <c:pt idx="3">
-                  <c:v>0.79166666666666663</c:v>
+                  <c:v>0.139706</c:v>
                 </c:pt>
                 <c:pt idx="4">
-                  <c:v>0.75</c:v>
+                  <c:v>0.99250499999999997</c:v>
                 </c:pt>
                 <c:pt idx="5">
-                  <c:v>0.85207100591715978</c:v>
+                  <c:v>0.89235200000000003</c:v>
                 </c:pt>
               </c:numCache>
             </c:numRef>
           </c:val>
           <c:extLst>
             <c:ext xmlns:c16="http://schemas.microsoft.com/office/drawing/2014/chart" uri="{C3380CC4-5D6E-409C-BE32-E72D297353CC}">
-              <c16:uniqueId val="{00000002-5202-4148-9984-73503D82F1E3}"/>
+              <c16:uniqueId val="{00000002-3837-E341-91C2-5F12A1A5FE57}"/>
             </c:ext>
           </c:extLst>
         </c:ser>
@@ -1821,29 +1821,29 @@
                 <c:formatCode>General</c:formatCode>
                 <c:ptCount val="6"/>
                 <c:pt idx="0">
-                  <c:v>0.9</c:v>
+                  <c:v>0.89235600000000004</c:v>
                 </c:pt>
                 <c:pt idx="1">
-                  <c:v>0.33333333333333331</c:v>
+                  <c:v>0.41666700000000001</c:v>
                 </c:pt>
                 <c:pt idx="2">
-                  <c:v>0.90489913544668588</c:v>
+                  <c:v>0.90143099999999998</c:v>
                 </c:pt>
                 <c:pt idx="3">
-                  <c:v>2.9411764705882349E-2</c:v>
+                  <c:v>7.4626999999999999E-2</c:v>
                 </c:pt>
                 <c:pt idx="4">
-                  <c:v>0.99367088607594933</c:v>
+                  <c:v>0.98780500000000004</c:v>
                 </c:pt>
                 <c:pt idx="5">
-                  <c:v>0.63400576368876072</c:v>
+                  <c:v>0.81359300000000001</c:v>
                 </c:pt>
               </c:numCache>
             </c:numRef>
           </c:val>
           <c:extLst>
             <c:ext xmlns:c16="http://schemas.microsoft.com/office/drawing/2014/chart" uri="{C3380CC4-5D6E-409C-BE32-E72D297353CC}">
-              <c16:uniqueId val="{00000003-5202-4148-9984-73503D82F1E3}"/>
+              <c16:uniqueId val="{00000003-3837-E341-91C2-5F12A1A5FE57}"/>
             </c:ext>
           </c:extLst>
         </c:ser>
@@ -1963,8 +1963,8 @@
             <c:manualLayout>
               <c:xMode val="edge"/>
               <c:yMode val="edge"/>
-              <c:x val="0"/>
-              <c:y val="0.39928111853501608"/>
+              <c:x val="9.362780334639019E-3"/>
+              <c:y val="0.40713804083807648"/>
             </c:manualLayout>
           </c:layout>
           <c:overlay val="0"/>
@@ -2025,9 +2025,9 @@
         <c:manualLayout>
           <c:xMode val="edge"/>
           <c:yMode val="edge"/>
-          <c:x val="0.67811422413793099"/>
+          <c:x val="0.71866338596870727"/>
           <c:y val="2.8314369099621595E-2"/>
-          <c:w val="0.27756625159642401"/>
+          <c:w val="0.23701708847069006"/>
           <c:h val="0.14555087299466088"/>
         </c:manualLayout>
       </c:layout>
@@ -3846,7 +3846,7 @@
           <a:p>
             <a:fld id="{8F11C44F-2252-F841-8CAD-79051FA22CF7}" type="datetimeFigureOut">
               <a:rPr lang="en-US" smtClean="0"/>
-              <a:t>1/11/24</a:t>
+              <a:t>4/8/24</a:t>
             </a:fld>
             <a:endParaRPr lang="en-US"/>
           </a:p>
@@ -4344,7 +4344,7 @@
           <a:p>
             <a:fld id="{BCA0E4FB-80A7-EA44-BA69-57CF512EE08D}" type="datetimeFigureOut">
               <a:rPr lang="en-US" smtClean="0"/>
-              <a:t>1/11/24</a:t>
+              <a:t>4/8/24</a:t>
             </a:fld>
             <a:endParaRPr lang="en-US"/>
           </a:p>
@@ -4542,7 +4542,7 @@
           <a:p>
             <a:fld id="{BCA0E4FB-80A7-EA44-BA69-57CF512EE08D}" type="datetimeFigureOut">
               <a:rPr lang="en-US" smtClean="0"/>
-              <a:t>1/11/24</a:t>
+              <a:t>4/8/24</a:t>
             </a:fld>
             <a:endParaRPr lang="en-US"/>
           </a:p>
@@ -4750,7 +4750,7 @@
           <a:p>
             <a:fld id="{BCA0E4FB-80A7-EA44-BA69-57CF512EE08D}" type="datetimeFigureOut">
               <a:rPr lang="en-US" smtClean="0"/>
-              <a:t>1/11/24</a:t>
+              <a:t>4/8/24</a:t>
             </a:fld>
             <a:endParaRPr lang="en-US"/>
           </a:p>
@@ -4948,7 +4948,7 @@
           <a:p>
             <a:fld id="{BCA0E4FB-80A7-EA44-BA69-57CF512EE08D}" type="datetimeFigureOut">
               <a:rPr lang="en-US" smtClean="0"/>
-              <a:t>1/11/24</a:t>
+              <a:t>4/8/24</a:t>
             </a:fld>
             <a:endParaRPr lang="en-US"/>
           </a:p>
@@ -5223,7 +5223,7 @@
           <a:p>
             <a:fld id="{BCA0E4FB-80A7-EA44-BA69-57CF512EE08D}" type="datetimeFigureOut">
               <a:rPr lang="en-US" smtClean="0"/>
-              <a:t>1/11/24</a:t>
+              <a:t>4/8/24</a:t>
             </a:fld>
             <a:endParaRPr lang="en-US"/>
           </a:p>
@@ -5488,7 +5488,7 @@
           <a:p>
             <a:fld id="{BCA0E4FB-80A7-EA44-BA69-57CF512EE08D}" type="datetimeFigureOut">
               <a:rPr lang="en-US" smtClean="0"/>
-              <a:t>1/11/24</a:t>
+              <a:t>4/8/24</a:t>
             </a:fld>
             <a:endParaRPr lang="en-US"/>
           </a:p>
@@ -5900,7 +5900,7 @@
           <a:p>
             <a:fld id="{BCA0E4FB-80A7-EA44-BA69-57CF512EE08D}" type="datetimeFigureOut">
               <a:rPr lang="en-US" smtClean="0"/>
-              <a:t>1/11/24</a:t>
+              <a:t>4/8/24</a:t>
             </a:fld>
             <a:endParaRPr lang="en-US"/>
           </a:p>
@@ -6041,7 +6041,7 @@
           <a:p>
             <a:fld id="{BCA0E4FB-80A7-EA44-BA69-57CF512EE08D}" type="datetimeFigureOut">
               <a:rPr lang="en-US" smtClean="0"/>
-              <a:t>1/11/24</a:t>
+              <a:t>4/8/24</a:t>
             </a:fld>
             <a:endParaRPr lang="en-US"/>
           </a:p>
@@ -6154,7 +6154,7 @@
           <a:p>
             <a:fld id="{BCA0E4FB-80A7-EA44-BA69-57CF512EE08D}" type="datetimeFigureOut">
               <a:rPr lang="en-US" smtClean="0"/>
-              <a:t>1/11/24</a:t>
+              <a:t>4/8/24</a:t>
             </a:fld>
             <a:endParaRPr lang="en-US"/>
           </a:p>
@@ -6465,7 +6465,7 @@
           <a:p>
             <a:fld id="{BCA0E4FB-80A7-EA44-BA69-57CF512EE08D}" type="datetimeFigureOut">
               <a:rPr lang="en-US" smtClean="0"/>
-              <a:t>1/11/24</a:t>
+              <a:t>4/8/24</a:t>
             </a:fld>
             <a:endParaRPr lang="en-US"/>
           </a:p>
@@ -6753,7 +6753,7 @@
           <a:p>
             <a:fld id="{BCA0E4FB-80A7-EA44-BA69-57CF512EE08D}" type="datetimeFigureOut">
               <a:rPr lang="en-US" smtClean="0"/>
-              <a:t>1/11/24</a:t>
+              <a:t>4/8/24</a:t>
             </a:fld>
             <a:endParaRPr lang="en-US"/>
           </a:p>
@@ -6994,7 +6994,7 @@
           <a:p>
             <a:fld id="{BCA0E4FB-80A7-EA44-BA69-57CF512EE08D}" type="datetimeFigureOut">
               <a:rPr lang="en-US" smtClean="0"/>
-              <a:t>1/11/24</a:t>
+              <a:t>4/8/24</a:t>
             </a:fld>
             <a:endParaRPr lang="en-US"/>
           </a:p>
@@ -7413,10 +7413,10 @@
       </p:grpSpPr>
       <p:grpSp>
         <p:nvGrpSpPr>
-          <p:cNvPr id="10" name="Group 9">
+          <p:cNvPr id="15" name="Group 14">
             <a:extLst>
               <a:ext uri="{FF2B5EF4-FFF2-40B4-BE49-F238E27FC236}">
-                <a16:creationId xmlns:a16="http://schemas.microsoft.com/office/drawing/2014/main" id="{1F37608D-13D1-F17E-8EE7-ABC2A456CFE8}"/>
+                <a16:creationId xmlns:a16="http://schemas.microsoft.com/office/drawing/2014/main" id="{3537CF07-2E38-B9F4-0751-52A9AFD8C31D}"/>
               </a:ext>
             </a:extLst>
           </p:cNvPr>
@@ -7425,15 +7425,15 @@
         </p:nvGrpSpPr>
         <p:grpSpPr>
           <a:xfrm>
-            <a:off x="990282" y="196200"/>
-            <a:ext cx="10211438" cy="6661800"/>
-            <a:chOff x="990282" y="196200"/>
-            <a:chExt cx="10211438" cy="6661800"/>
+            <a:off x="372360" y="-401517"/>
+            <a:ext cx="11447279" cy="7661034"/>
+            <a:chOff x="372360" y="-401517"/>
+            <a:chExt cx="11447279" cy="7661034"/>
           </a:xfrm>
         </p:grpSpPr>
         <p:graphicFrame>
           <p:nvGraphicFramePr>
-            <p:cNvPr id="4" name="Chart 3">
+            <p:cNvPr id="12" name="Chart 11">
               <a:extLst>
                 <a:ext uri="{FF2B5EF4-FFF2-40B4-BE49-F238E27FC236}">
                   <a16:creationId xmlns:a16="http://schemas.microsoft.com/office/drawing/2014/main" id="{050689BB-CDE0-0ECB-C1B9-087C70152808}"/>
@@ -7446,14 +7446,14 @@
             <p:nvPr>
               <p:extLst>
                 <p:ext uri="{D42A27DB-BD31-4B8C-83A1-F6EECF244321}">
-                  <p14:modId xmlns:p14="http://schemas.microsoft.com/office/powerpoint/2010/main" val="1096288472"/>
+                  <p14:modId xmlns:p14="http://schemas.microsoft.com/office/powerpoint/2010/main" val="3047823164"/>
                 </p:ext>
               </p:extLst>
             </p:nvPr>
           </p:nvGraphicFramePr>
           <p:xfrm>
-            <a:off x="990282" y="196200"/>
-            <a:ext cx="5011200" cy="3232800"/>
+            <a:off x="372360" y="-360788"/>
+            <a:ext cx="5581598" cy="3635067"/>
           </p:xfrm>
           <a:graphic>
             <a:graphicData uri="http://schemas.openxmlformats.org/drawingml/2006/chart">
@@ -7463,7 +7463,7 @@
         </p:graphicFrame>
         <p:graphicFrame>
           <p:nvGraphicFramePr>
-            <p:cNvPr id="5" name="Chart 4">
+            <p:cNvPr id="13" name="Chart 12">
               <a:extLst>
                 <a:ext uri="{FF2B5EF4-FFF2-40B4-BE49-F238E27FC236}">
                   <a16:creationId xmlns:a16="http://schemas.microsoft.com/office/drawing/2014/main" id="{FBE1AA2B-24B7-119C-49B1-02EA1138D890}"/>
@@ -7476,14 +7476,14 @@
             <p:nvPr>
               <p:extLst>
                 <p:ext uri="{D42A27DB-BD31-4B8C-83A1-F6EECF244321}">
-                  <p14:modId xmlns:p14="http://schemas.microsoft.com/office/powerpoint/2010/main" val="3221473180"/>
+                  <p14:modId xmlns:p14="http://schemas.microsoft.com/office/powerpoint/2010/main" val="2778060681"/>
                 </p:ext>
               </p:extLst>
             </p:nvPr>
           </p:nvGraphicFramePr>
           <p:xfrm>
-            <a:off x="6190520" y="196200"/>
-            <a:ext cx="5011200" cy="3232800"/>
+            <a:off x="384168" y="3462452"/>
+            <a:ext cx="5582561" cy="3797065"/>
           </p:xfrm>
           <a:graphic>
             <a:graphicData uri="http://schemas.openxmlformats.org/drawingml/2006/chart">
@@ -7493,7 +7493,7 @@
         </p:graphicFrame>
         <p:graphicFrame>
           <p:nvGraphicFramePr>
-            <p:cNvPr id="6" name="Chart 5">
+            <p:cNvPr id="14" name="Chart 13">
               <a:extLst>
                 <a:ext uri="{FF2B5EF4-FFF2-40B4-BE49-F238E27FC236}">
                   <a16:creationId xmlns:a16="http://schemas.microsoft.com/office/drawing/2014/main" id="{BC5D5D8C-F9DF-67C9-45BD-A1E4415C5CDF}"/>
@@ -7506,14 +7506,14 @@
             <p:nvPr>
               <p:extLst>
                 <p:ext uri="{D42A27DB-BD31-4B8C-83A1-F6EECF244321}">
-                  <p14:modId xmlns:p14="http://schemas.microsoft.com/office/powerpoint/2010/main" val="1793513855"/>
+                  <p14:modId xmlns:p14="http://schemas.microsoft.com/office/powerpoint/2010/main" val="1472193167"/>
                 </p:ext>
               </p:extLst>
             </p:nvPr>
           </p:nvGraphicFramePr>
           <p:xfrm>
-            <a:off x="990282" y="3625200"/>
-            <a:ext cx="5011200" cy="3232800"/>
+            <a:off x="6223248" y="-401517"/>
+            <a:ext cx="5596391" cy="3602946"/>
           </p:xfrm>
           <a:graphic>
             <a:graphicData uri="http://schemas.openxmlformats.org/drawingml/2006/chart">
@@ -7521,120 +7521,6 @@
             </a:graphicData>
           </a:graphic>
         </p:graphicFrame>
-        <p:sp>
-          <p:nvSpPr>
-            <p:cNvPr id="7" name="TextBox 6">
-              <a:extLst>
-                <a:ext uri="{FF2B5EF4-FFF2-40B4-BE49-F238E27FC236}">
-                  <a16:creationId xmlns:a16="http://schemas.microsoft.com/office/drawing/2014/main" id="{961F6ADB-87C1-9B78-737E-912F5B16051A}"/>
-                </a:ext>
-              </a:extLst>
-            </p:cNvPr>
-            <p:cNvSpPr txBox="1"/>
-            <p:nvPr/>
-          </p:nvSpPr>
-          <p:spPr>
-            <a:xfrm>
-              <a:off x="1004764" y="348792"/>
-              <a:ext cx="370614" cy="400110"/>
-            </a:xfrm>
-            <a:prstGeom prst="rect">
-              <a:avLst/>
-            </a:prstGeom>
-            <a:noFill/>
-          </p:spPr>
-          <p:txBody>
-            <a:bodyPr wrap="none" rtlCol="0">
-              <a:spAutoFit/>
-            </a:bodyPr>
-            <a:lstStyle/>
-            <a:p>
-              <a:r>
-                <a:rPr lang="en-US" sz="2000" b="1" dirty="0">
-                  <a:latin typeface="Arial" panose="020B0604020202020204" pitchFamily="34" charset="0"/>
-                  <a:cs typeface="Arial" panose="020B0604020202020204" pitchFamily="34" charset="0"/>
-                </a:rPr>
-                <a:t>A</a:t>
-              </a:r>
-            </a:p>
-          </p:txBody>
-        </p:sp>
-        <p:sp>
-          <p:nvSpPr>
-            <p:cNvPr id="8" name="TextBox 7">
-              <a:extLst>
-                <a:ext uri="{FF2B5EF4-FFF2-40B4-BE49-F238E27FC236}">
-                  <a16:creationId xmlns:a16="http://schemas.microsoft.com/office/drawing/2014/main" id="{1F3E76BC-521A-CEEA-651A-BCCEF415F7FB}"/>
-                </a:ext>
-              </a:extLst>
-            </p:cNvPr>
-            <p:cNvSpPr txBox="1"/>
-            <p:nvPr/>
-          </p:nvSpPr>
-          <p:spPr>
-            <a:xfrm>
-              <a:off x="6211163" y="337603"/>
-              <a:ext cx="370614" cy="400110"/>
-            </a:xfrm>
-            <a:prstGeom prst="rect">
-              <a:avLst/>
-            </a:prstGeom>
-            <a:noFill/>
-          </p:spPr>
-          <p:txBody>
-            <a:bodyPr wrap="none" rtlCol="0">
-              <a:spAutoFit/>
-            </a:bodyPr>
-            <a:lstStyle/>
-            <a:p>
-              <a:r>
-                <a:rPr lang="en-US" sz="2000" b="1" dirty="0">
-                  <a:latin typeface="Arial" panose="020B0604020202020204" pitchFamily="34" charset="0"/>
-                  <a:cs typeface="Arial" panose="020B0604020202020204" pitchFamily="34" charset="0"/>
-                </a:rPr>
-                <a:t>B</a:t>
-              </a:r>
-            </a:p>
-          </p:txBody>
-        </p:sp>
-        <p:sp>
-          <p:nvSpPr>
-            <p:cNvPr id="9" name="TextBox 8">
-              <a:extLst>
-                <a:ext uri="{FF2B5EF4-FFF2-40B4-BE49-F238E27FC236}">
-                  <a16:creationId xmlns:a16="http://schemas.microsoft.com/office/drawing/2014/main" id="{CA59F8A4-9F83-C39E-2B85-1DEA66651B5F}"/>
-                </a:ext>
-              </a:extLst>
-            </p:cNvPr>
-            <p:cNvSpPr txBox="1"/>
-            <p:nvPr/>
-          </p:nvSpPr>
-          <p:spPr>
-            <a:xfrm>
-              <a:off x="1004764" y="3747751"/>
-              <a:ext cx="370614" cy="400110"/>
-            </a:xfrm>
-            <a:prstGeom prst="rect">
-              <a:avLst/>
-            </a:prstGeom>
-            <a:noFill/>
-          </p:spPr>
-          <p:txBody>
-            <a:bodyPr wrap="none" rtlCol="0">
-              <a:spAutoFit/>
-            </a:bodyPr>
-            <a:lstStyle/>
-            <a:p>
-              <a:r>
-                <a:rPr lang="en-US" sz="2000" b="1" dirty="0">
-                  <a:latin typeface="Arial" panose="020B0604020202020204" pitchFamily="34" charset="0"/>
-                  <a:cs typeface="Arial" panose="020B0604020202020204" pitchFamily="34" charset="0"/>
-                </a:rPr>
-                <a:t>C</a:t>
-              </a:r>
-            </a:p>
-          </p:txBody>
-        </p:sp>
       </p:grpSp>
     </p:spTree>
     <p:extLst>
@@ -8007,72 +7893,12 @@
           <a:chExt cx="0" cy="0"/>
         </a:xfrm>
       </p:grpSpPr>
-      <p:sp useBgFill="1">
-        <p:nvSpPr>
-          <p:cNvPr id="20" name="Rectangle 19">
+      <p:grpSp>
+        <p:nvGrpSpPr>
+          <p:cNvPr id="17" name="Group 16">
             <a:extLst>
               <a:ext uri="{FF2B5EF4-FFF2-40B4-BE49-F238E27FC236}">
-                <a16:creationId xmlns:a16="http://schemas.microsoft.com/office/drawing/2014/main" id="{C7336F7B-7038-4227-BCAC-E417CC3F669D}"/>
-              </a:ext>
-              <a:ext uri="{C183D7F6-B498-43B3-948B-1728B52AA6E4}">
-                <adec:decorative xmlns:adec="http://schemas.microsoft.com/office/drawing/2017/decorative" val="1"/>
-              </a:ext>
-            </a:extLst>
-          </p:cNvPr>
-          <p:cNvSpPr>
-            <a:spLocks noGrp="1" noRot="1" noChangeAspect="1" noMove="1" noResize="1" noEditPoints="1" noAdjustHandles="1" noChangeArrowheads="1" noChangeShapeType="1" noTextEdit="1"/>
-          </p:cNvSpPr>
-          <p:nvPr>
-            <p:extLst>
-              <p:ext uri="{386F3935-93C4-4BCD-93E2-E3B085C9AB24}">
-                <p16:designElem xmlns:p16="http://schemas.microsoft.com/office/powerpoint/2015/main" val="1"/>
-              </p:ext>
-            </p:extLst>
-          </p:nvPr>
-        </p:nvSpPr>
-        <p:spPr>
-          <a:xfrm>
-            <a:off x="0" y="-1"/>
-            <a:ext cx="12188952" cy="6858000"/>
-          </a:xfrm>
-          <a:prstGeom prst="rect">
-            <a:avLst/>
-          </a:prstGeom>
-          <a:ln>
-            <a:noFill/>
-          </a:ln>
-        </p:spPr>
-        <p:style>
-          <a:lnRef idx="2">
-            <a:schemeClr val="accent1">
-              <a:shade val="50000"/>
-            </a:schemeClr>
-          </a:lnRef>
-          <a:fillRef idx="1">
-            <a:schemeClr val="accent1"/>
-          </a:fillRef>
-          <a:effectRef idx="0">
-            <a:schemeClr val="accent1"/>
-          </a:effectRef>
-          <a:fontRef idx="minor">
-            <a:schemeClr val="lt1"/>
-          </a:fontRef>
-        </p:style>
-        <p:txBody>
-          <a:bodyPr rtlCol="0" anchor="ctr"/>
-          <a:lstStyle/>
-          <a:p>
-            <a:pPr algn="ctr"/>
-            <a:endParaRPr lang="en-US"/>
-          </a:p>
-        </p:txBody>
-      </p:sp>
-      <p:grpSp>
-        <p:nvGrpSpPr>
-          <p:cNvPr id="44" name="Group 43">
-            <a:extLst>
-              <a:ext uri="{FF2B5EF4-FFF2-40B4-BE49-F238E27FC236}">
-                <a16:creationId xmlns:a16="http://schemas.microsoft.com/office/drawing/2014/main" id="{C83F8737-5177-CB85-D045-163C3636AB41}"/>
+                <a16:creationId xmlns:a16="http://schemas.microsoft.com/office/drawing/2014/main" id="{44E68CA9-03BE-5C0E-D3A0-1B04DEDEAE21}"/>
               </a:ext>
             </a:extLst>
           </p:cNvPr>
@@ -8081,213 +7907,18 @@
         </p:nvGrpSpPr>
         <p:grpSpPr>
           <a:xfrm>
-            <a:off x="23734" y="138466"/>
-            <a:ext cx="12141483" cy="6719534"/>
-            <a:chOff x="23734" y="138466"/>
-            <a:chExt cx="12141483" cy="6719534"/>
+            <a:off x="-3052" y="138466"/>
+            <a:ext cx="12171318" cy="6719533"/>
+            <a:chOff x="-3052" y="138466"/>
+            <a:chExt cx="12171318" cy="6719533"/>
           </a:xfrm>
         </p:grpSpPr>
-        <p:grpSp>
-          <p:nvGrpSpPr>
-            <p:cNvPr id="39" name="Group 38">
+        <p:sp>
+          <p:nvSpPr>
+            <p:cNvPr id="18" name="TextBox 17">
               <a:extLst>
                 <a:ext uri="{FF2B5EF4-FFF2-40B4-BE49-F238E27FC236}">
-                  <a16:creationId xmlns:a16="http://schemas.microsoft.com/office/drawing/2014/main" id="{384A6135-D0F4-7C64-1144-D528222CAC33}"/>
-                </a:ext>
-              </a:extLst>
-            </p:cNvPr>
-            <p:cNvGrpSpPr/>
-            <p:nvPr/>
-          </p:nvGrpSpPr>
-          <p:grpSpPr>
-            <a:xfrm>
-              <a:off x="23734" y="382952"/>
-              <a:ext cx="12141483" cy="6475048"/>
-              <a:chOff x="25258" y="175845"/>
-              <a:chExt cx="12141483" cy="6475048"/>
-            </a:xfrm>
-          </p:grpSpPr>
-          <p:pic>
-            <p:nvPicPr>
-              <p:cNvPr id="24" name="Picture 23">
-                <a:extLst>
-                  <a:ext uri="{FF2B5EF4-FFF2-40B4-BE49-F238E27FC236}">
-                    <a16:creationId xmlns:a16="http://schemas.microsoft.com/office/drawing/2014/main" id="{0D9E0851-5BC0-6111-7DFD-25256A550C39}"/>
-                  </a:ext>
-                </a:extLst>
-              </p:cNvPr>
-              <p:cNvPicPr>
-                <a:picLocks noChangeAspect="1"/>
-              </p:cNvPicPr>
-              <p:nvPr/>
-            </p:nvPicPr>
-            <p:blipFill rotWithShape="1">
-              <a:blip r:embed="rId3"/>
-              <a:srcRect l="6111" t="4702" r="8854" b="2616"/>
-              <a:stretch/>
-            </p:blipFill>
-            <p:spPr>
-              <a:xfrm>
-                <a:off x="8231258" y="175845"/>
-                <a:ext cx="3852985" cy="3149600"/>
-              </a:xfrm>
-              <a:prstGeom prst="rect">
-                <a:avLst/>
-              </a:prstGeom>
-            </p:spPr>
-          </p:pic>
-          <p:pic>
-            <p:nvPicPr>
-              <p:cNvPr id="28" name="Picture 27">
-                <a:extLst>
-                  <a:ext uri="{FF2B5EF4-FFF2-40B4-BE49-F238E27FC236}">
-                    <a16:creationId xmlns:a16="http://schemas.microsoft.com/office/drawing/2014/main" id="{4DE3C4EC-121C-0371-5A2D-2D630EA3C83E}"/>
-                  </a:ext>
-                </a:extLst>
-              </p:cNvPr>
-              <p:cNvPicPr>
-                <a:picLocks noChangeAspect="1"/>
-              </p:cNvPicPr>
-              <p:nvPr/>
-            </p:nvPicPr>
-            <p:blipFill rotWithShape="1">
-              <a:blip r:embed="rId4"/>
-              <a:srcRect l="5692" t="5519" r="9274" b="1799"/>
-              <a:stretch/>
-            </p:blipFill>
-            <p:spPr>
-              <a:xfrm>
-                <a:off x="107757" y="175845"/>
-                <a:ext cx="3852984" cy="3149600"/>
-              </a:xfrm>
-              <a:prstGeom prst="rect">
-                <a:avLst/>
-              </a:prstGeom>
-            </p:spPr>
-          </p:pic>
-          <p:pic>
-            <p:nvPicPr>
-              <p:cNvPr id="31" name="Picture 30">
-                <a:extLst>
-                  <a:ext uri="{FF2B5EF4-FFF2-40B4-BE49-F238E27FC236}">
-                    <a16:creationId xmlns:a16="http://schemas.microsoft.com/office/drawing/2014/main" id="{F0102748-EFF5-7063-9C10-06D8EFD0DFE5}"/>
-                  </a:ext>
-                </a:extLst>
-              </p:cNvPr>
-              <p:cNvPicPr>
-                <a:picLocks noChangeAspect="1"/>
-              </p:cNvPicPr>
-              <p:nvPr/>
-            </p:nvPicPr>
-            <p:blipFill rotWithShape="1">
-              <a:blip r:embed="rId5"/>
-              <a:srcRect l="6496" t="5470" r="9231" b="2678"/>
-              <a:stretch/>
-            </p:blipFill>
-            <p:spPr>
-              <a:xfrm>
-                <a:off x="4167982" y="175845"/>
-                <a:ext cx="3852985" cy="3149601"/>
-              </a:xfrm>
-              <a:prstGeom prst="rect">
-                <a:avLst/>
-              </a:prstGeom>
-            </p:spPr>
-          </p:pic>
-          <p:pic>
-            <p:nvPicPr>
-              <p:cNvPr id="33" name="Picture 32" descr="A graph with a bar graph&#10;&#10;Description automatically generated with medium confidence">
-                <a:extLst>
-                  <a:ext uri="{FF2B5EF4-FFF2-40B4-BE49-F238E27FC236}">
-                    <a16:creationId xmlns:a16="http://schemas.microsoft.com/office/drawing/2014/main" id="{D612C3EA-E870-30B0-4E46-ACC910F9BB3E}"/>
-                  </a:ext>
-                </a:extLst>
-              </p:cNvPr>
-              <p:cNvPicPr>
-                <a:picLocks noChangeAspect="1"/>
-              </p:cNvPicPr>
-              <p:nvPr/>
-            </p:nvPicPr>
-            <p:blipFill rotWithShape="1">
-              <a:blip r:embed="rId6"/>
-              <a:srcRect l="4659" t="7854" r="9156" b="2067"/>
-              <a:stretch/>
-            </p:blipFill>
-            <p:spPr>
-              <a:xfrm>
-                <a:off x="8148758" y="3429851"/>
-                <a:ext cx="4017983" cy="3149601"/>
-              </a:xfrm>
-              <a:prstGeom prst="rect">
-                <a:avLst/>
-              </a:prstGeom>
-            </p:spPr>
-          </p:pic>
-          <p:pic>
-            <p:nvPicPr>
-              <p:cNvPr id="35" name="Picture 34" descr="A graph of positive and negative results&#10;&#10;Description automatically generated">
-                <a:extLst>
-                  <a:ext uri="{FF2B5EF4-FFF2-40B4-BE49-F238E27FC236}">
-                    <a16:creationId xmlns:a16="http://schemas.microsoft.com/office/drawing/2014/main" id="{07804FDA-7E0D-A70B-99FB-C745660BFC77}"/>
-                  </a:ext>
-                </a:extLst>
-              </p:cNvPr>
-              <p:cNvPicPr>
-                <a:picLocks noChangeAspect="1"/>
-              </p:cNvPicPr>
-              <p:nvPr/>
-            </p:nvPicPr>
-            <p:blipFill rotWithShape="1">
-              <a:blip r:embed="rId7"/>
-              <a:srcRect l="4665" t="9921" r="9149"/>
-              <a:stretch/>
-            </p:blipFill>
-            <p:spPr>
-              <a:xfrm>
-                <a:off x="25258" y="3501293"/>
-                <a:ext cx="4017982" cy="3149600"/>
-              </a:xfrm>
-              <a:prstGeom prst="rect">
-                <a:avLst/>
-              </a:prstGeom>
-            </p:spPr>
-          </p:pic>
-          <p:pic>
-            <p:nvPicPr>
-              <p:cNvPr id="38" name="Picture 37" descr="A graph of positive and negative results&#10;&#10;Description automatically generated">
-                <a:extLst>
-                  <a:ext uri="{FF2B5EF4-FFF2-40B4-BE49-F238E27FC236}">
-                    <a16:creationId xmlns:a16="http://schemas.microsoft.com/office/drawing/2014/main" id="{1DE309B0-80D8-B55A-27A1-565C92A6AF6E}"/>
-                  </a:ext>
-                </a:extLst>
-              </p:cNvPr>
-              <p:cNvPicPr>
-                <a:picLocks noChangeAspect="1"/>
-              </p:cNvPicPr>
-              <p:nvPr/>
-            </p:nvPicPr>
-            <p:blipFill rotWithShape="1">
-              <a:blip r:embed="rId8"/>
-              <a:srcRect l="5108" t="9862" r="8649"/>
-              <a:stretch/>
-            </p:blipFill>
-            <p:spPr>
-              <a:xfrm>
-                <a:off x="4085483" y="3501292"/>
-                <a:ext cx="4017982" cy="3149601"/>
-              </a:xfrm>
-              <a:prstGeom prst="rect">
-                <a:avLst/>
-              </a:prstGeom>
-            </p:spPr>
-          </p:pic>
-        </p:grpSp>
-        <p:sp>
-          <p:nvSpPr>
-            <p:cNvPr id="40" name="TextBox 39">
-              <a:extLst>
-                <a:ext uri="{FF2B5EF4-FFF2-40B4-BE49-F238E27FC236}">
-                  <a16:creationId xmlns:a16="http://schemas.microsoft.com/office/drawing/2014/main" id="{FEBBAB49-554C-44C1-EC79-A9F46C1BC2D7}"/>
+                  <a16:creationId xmlns:a16="http://schemas.microsoft.com/office/drawing/2014/main" id="{D4B9F0C1-A5F9-00BD-841E-29AA2D587F81}"/>
                 </a:ext>
               </a:extLst>
             </p:cNvPr>
@@ -8296,8 +7927,8 @@
           </p:nvSpPr>
           <p:spPr>
             <a:xfrm>
-              <a:off x="96885" y="138466"/>
-              <a:ext cx="370614" cy="400110"/>
+              <a:off x="8194755" y="178528"/>
+              <a:ext cx="327334" cy="400110"/>
             </a:xfrm>
             <a:prstGeom prst="rect">
               <a:avLst/>
@@ -8315,17 +7946,17 @@
                   <a:latin typeface="Arial" panose="020B0604020202020204" pitchFamily="34" charset="0"/>
                   <a:cs typeface="Arial" panose="020B0604020202020204" pitchFamily="34" charset="0"/>
                 </a:rPr>
-                <a:t>A</a:t>
+                <a:t>c</a:t>
               </a:r>
             </a:p>
           </p:txBody>
         </p:sp>
         <p:sp>
           <p:nvSpPr>
-            <p:cNvPr id="41" name="TextBox 40">
+            <p:cNvPr id="19" name="TextBox 18">
               <a:extLst>
                 <a:ext uri="{FF2B5EF4-FFF2-40B4-BE49-F238E27FC236}">
-                  <a16:creationId xmlns:a16="http://schemas.microsoft.com/office/drawing/2014/main" id="{DFF59852-8CBC-402B-A67B-449419F4B3DB}"/>
+                  <a16:creationId xmlns:a16="http://schemas.microsoft.com/office/drawing/2014/main" id="{D974D645-545F-E3D8-267F-16D98FE47CB6}"/>
                 </a:ext>
               </a:extLst>
             </p:cNvPr>
@@ -8335,7 +7966,7 @@
           <p:spPr>
             <a:xfrm>
               <a:off x="4099737" y="164240"/>
-              <a:ext cx="370614" cy="400110"/>
+              <a:ext cx="341760" cy="400110"/>
             </a:xfrm>
             <a:prstGeom prst="rect">
               <a:avLst/>
@@ -8353,17 +7984,17 @@
                   <a:latin typeface="Arial" panose="020B0604020202020204" pitchFamily="34" charset="0"/>
                   <a:cs typeface="Arial" panose="020B0604020202020204" pitchFamily="34" charset="0"/>
                 </a:rPr>
-                <a:t>B</a:t>
+                <a:t>b</a:t>
               </a:r>
             </a:p>
           </p:txBody>
         </p:sp>
         <p:sp>
           <p:nvSpPr>
-            <p:cNvPr id="42" name="TextBox 41">
+            <p:cNvPr id="21" name="TextBox 20">
               <a:extLst>
                 <a:ext uri="{FF2B5EF4-FFF2-40B4-BE49-F238E27FC236}">
-                  <a16:creationId xmlns:a16="http://schemas.microsoft.com/office/drawing/2014/main" id="{7DABE5C9-82E2-697F-BD46-F74961A128DC}"/>
+                  <a16:creationId xmlns:a16="http://schemas.microsoft.com/office/drawing/2014/main" id="{B55123DC-1B2C-2E7C-1143-2C8FE2F4CF34}"/>
                 </a:ext>
               </a:extLst>
             </p:cNvPr>
@@ -8372,8 +8003,8 @@
           </p:nvSpPr>
           <p:spPr>
             <a:xfrm>
-              <a:off x="8194755" y="178528"/>
-              <a:ext cx="370614" cy="400110"/>
+              <a:off x="96885" y="138466"/>
+              <a:ext cx="327334" cy="400110"/>
             </a:xfrm>
             <a:prstGeom prst="rect">
               <a:avLst/>
@@ -8391,11 +8022,185 @@
                   <a:latin typeface="Arial" panose="020B0604020202020204" pitchFamily="34" charset="0"/>
                   <a:cs typeface="Arial" panose="020B0604020202020204" pitchFamily="34" charset="0"/>
                 </a:rPr>
-                <a:t>C</a:t>
+                <a:t>a</a:t>
               </a:r>
             </a:p>
           </p:txBody>
         </p:sp>
+        <p:pic>
+          <p:nvPicPr>
+            <p:cNvPr id="22" name="Picture 21" descr="A graph of positive and negative results&#10;&#10;Description automatically generated">
+              <a:extLst>
+                <a:ext uri="{FF2B5EF4-FFF2-40B4-BE49-F238E27FC236}">
+                  <a16:creationId xmlns:a16="http://schemas.microsoft.com/office/drawing/2014/main" id="{1B797AD4-3E50-3EFC-F8C6-160521C41B08}"/>
+                </a:ext>
+              </a:extLst>
+            </p:cNvPr>
+            <p:cNvPicPr>
+              <a:picLocks noChangeAspect="1"/>
+            </p:cNvPicPr>
+            <p:nvPr/>
+          </p:nvPicPr>
+          <p:blipFill rotWithShape="1">
+            <a:blip r:embed="rId3"/>
+            <a:srcRect l="4131" t="9777" r="8262"/>
+            <a:stretch/>
+          </p:blipFill>
+          <p:spPr>
+            <a:xfrm>
+              <a:off x="8090061" y="3707999"/>
+              <a:ext cx="4078205" cy="3150000"/>
+            </a:xfrm>
+            <a:prstGeom prst="rect">
+              <a:avLst/>
+            </a:prstGeom>
+          </p:spPr>
+        </p:pic>
+        <p:pic>
+          <p:nvPicPr>
+            <p:cNvPr id="23" name="Picture 22">
+              <a:extLst>
+                <a:ext uri="{FF2B5EF4-FFF2-40B4-BE49-F238E27FC236}">
+                  <a16:creationId xmlns:a16="http://schemas.microsoft.com/office/drawing/2014/main" id="{86DF071A-4FFE-A6F6-A082-0FBC932D9447}"/>
+                </a:ext>
+              </a:extLst>
+            </p:cNvPr>
+            <p:cNvPicPr>
+              <a:picLocks noChangeAspect="1"/>
+            </p:cNvPicPr>
+            <p:nvPr/>
+          </p:nvPicPr>
+          <p:blipFill rotWithShape="1">
+            <a:blip r:embed="rId4"/>
+            <a:srcRect l="4227" t="12094" r="9030"/>
+            <a:stretch/>
+          </p:blipFill>
+          <p:spPr>
+            <a:xfrm>
+              <a:off x="-3052" y="3777038"/>
+              <a:ext cx="4026085" cy="3060000"/>
+            </a:xfrm>
+            <a:prstGeom prst="rect">
+              <a:avLst/>
+            </a:prstGeom>
+          </p:spPr>
+        </p:pic>
+        <p:pic>
+          <p:nvPicPr>
+            <p:cNvPr id="25" name="Picture 24">
+              <a:extLst>
+                <a:ext uri="{FF2B5EF4-FFF2-40B4-BE49-F238E27FC236}">
+                  <a16:creationId xmlns:a16="http://schemas.microsoft.com/office/drawing/2014/main" id="{A8BC48C7-ECB6-B45F-3FD7-AACD922D2AD0}"/>
+                </a:ext>
+              </a:extLst>
+            </p:cNvPr>
+            <p:cNvPicPr>
+              <a:picLocks noChangeAspect="1"/>
+            </p:cNvPicPr>
+            <p:nvPr/>
+          </p:nvPicPr>
+          <p:blipFill rotWithShape="1">
+            <a:blip r:embed="rId5"/>
+            <a:srcRect l="4034" t="10665" r="8603" b="1679"/>
+            <a:stretch/>
+          </p:blipFill>
+          <p:spPr>
+            <a:xfrm>
+              <a:off x="3990148" y="3723841"/>
+              <a:ext cx="4090281" cy="3078000"/>
+            </a:xfrm>
+            <a:prstGeom prst="rect">
+              <a:avLst/>
+            </a:prstGeom>
+          </p:spPr>
+        </p:pic>
+        <p:pic>
+          <p:nvPicPr>
+            <p:cNvPr id="26" name="Picture 25">
+              <a:extLst>
+                <a:ext uri="{FF2B5EF4-FFF2-40B4-BE49-F238E27FC236}">
+                  <a16:creationId xmlns:a16="http://schemas.microsoft.com/office/drawing/2014/main" id="{4F8904E3-5ADD-9E28-D1C1-8370669F5E7C}"/>
+                </a:ext>
+              </a:extLst>
+            </p:cNvPr>
+            <p:cNvPicPr>
+              <a:picLocks noChangeAspect="1"/>
+            </p:cNvPicPr>
+            <p:nvPr/>
+          </p:nvPicPr>
+          <p:blipFill rotWithShape="1">
+            <a:blip r:embed="rId6"/>
+            <a:srcRect l="5192" t="6267" r="9203"/>
+            <a:stretch/>
+          </p:blipFill>
+          <p:spPr>
+            <a:xfrm>
+              <a:off x="8197222" y="486920"/>
+              <a:ext cx="3835754" cy="3150000"/>
+            </a:xfrm>
+            <a:prstGeom prst="rect">
+              <a:avLst/>
+            </a:prstGeom>
+          </p:spPr>
+        </p:pic>
+        <p:pic>
+          <p:nvPicPr>
+            <p:cNvPr id="27" name="Picture 26">
+              <a:extLst>
+                <a:ext uri="{FF2B5EF4-FFF2-40B4-BE49-F238E27FC236}">
+                  <a16:creationId xmlns:a16="http://schemas.microsoft.com/office/drawing/2014/main" id="{BC1B8DB4-2093-49DA-D925-52F48F6B561D}"/>
+                </a:ext>
+              </a:extLst>
+            </p:cNvPr>
+            <p:cNvPicPr>
+              <a:picLocks noChangeAspect="1"/>
+            </p:cNvPicPr>
+            <p:nvPr/>
+          </p:nvPicPr>
+          <p:blipFill rotWithShape="1">
+            <a:blip r:embed="rId7"/>
+            <a:srcRect l="5999" t="6260" r="9371"/>
+            <a:stretch/>
+          </p:blipFill>
+          <p:spPr>
+            <a:xfrm>
+              <a:off x="135912" y="486920"/>
+              <a:ext cx="3791807" cy="3150000"/>
+            </a:xfrm>
+            <a:prstGeom prst="rect">
+              <a:avLst/>
+            </a:prstGeom>
+          </p:spPr>
+        </p:pic>
+        <p:pic>
+          <p:nvPicPr>
+            <p:cNvPr id="29" name="Picture 28">
+              <a:extLst>
+                <a:ext uri="{FF2B5EF4-FFF2-40B4-BE49-F238E27FC236}">
+                  <a16:creationId xmlns:a16="http://schemas.microsoft.com/office/drawing/2014/main" id="{8F1147C4-9003-B74D-0543-FDC7E531D71B}"/>
+                </a:ext>
+              </a:extLst>
+            </p:cNvPr>
+            <p:cNvPicPr>
+              <a:picLocks noChangeAspect="1"/>
+            </p:cNvPicPr>
+            <p:nvPr/>
+          </p:nvPicPr>
+          <p:blipFill rotWithShape="1">
+            <a:blip r:embed="rId8"/>
+            <a:srcRect l="5299" t="6153" r="8419"/>
+            <a:stretch/>
+          </p:blipFill>
+          <p:spPr>
+            <a:xfrm>
+              <a:off x="4163747" y="486920"/>
+              <a:ext cx="3861457" cy="3150000"/>
+            </a:xfrm>
+            <a:prstGeom prst="rect">
+              <a:avLst/>
+            </a:prstGeom>
+          </p:spPr>
+        </p:pic>
       </p:grpSp>
     </p:spTree>
     <p:extLst>
@@ -9114,383 +8919,126 @@
           <a:chExt cx="0" cy="0"/>
         </a:xfrm>
       </p:grpSpPr>
-      <p:grpSp>
-        <p:nvGrpSpPr>
-          <p:cNvPr id="18" name="Group 17">
+      <p:pic>
+        <p:nvPicPr>
+          <p:cNvPr id="40" name="Picture 39" descr="A graph of a positive rate&#10;&#10;Description automatically generated">
             <a:extLst>
               <a:ext uri="{FF2B5EF4-FFF2-40B4-BE49-F238E27FC236}">
-                <a16:creationId xmlns:a16="http://schemas.microsoft.com/office/drawing/2014/main" id="{D9C466AC-C4CF-83A9-36CD-409C2FAB2473}"/>
+                <a16:creationId xmlns:a16="http://schemas.microsoft.com/office/drawing/2014/main" id="{30FB615B-9BFA-3FF7-2C26-FECD26399C17}"/>
               </a:ext>
             </a:extLst>
           </p:cNvPr>
-          <p:cNvGrpSpPr/>
+          <p:cNvPicPr>
+            <a:picLocks noChangeAspect="1"/>
+          </p:cNvPicPr>
           <p:nvPr/>
-        </p:nvGrpSpPr>
-        <p:grpSpPr>
+        </p:nvPicPr>
+        <p:blipFill>
+          <a:blip r:embed="rId2"/>
+          <a:stretch>
+            <a:fillRect/>
+          </a:stretch>
+        </p:blipFill>
+        <p:spPr>
           <a:xfrm>
-            <a:off x="2686800" y="19800"/>
-            <a:ext cx="6847275" cy="6851008"/>
-            <a:chOff x="2686800" y="19800"/>
-            <a:chExt cx="6847275" cy="6851008"/>
+            <a:off x="2496000" y="3429000"/>
+            <a:ext cx="3600000" cy="3600000"/>
           </a:xfrm>
-        </p:grpSpPr>
-        <p:grpSp>
-          <p:nvGrpSpPr>
-            <p:cNvPr id="4" name="Group 3">
-              <a:extLst>
-                <a:ext uri="{FF2B5EF4-FFF2-40B4-BE49-F238E27FC236}">
-                  <a16:creationId xmlns:a16="http://schemas.microsoft.com/office/drawing/2014/main" id="{44A6572E-4410-C8E0-F4F4-9AA8D1FB3D8A}"/>
-                </a:ext>
-              </a:extLst>
-            </p:cNvPr>
-            <p:cNvGrpSpPr/>
-            <p:nvPr/>
-          </p:nvGrpSpPr>
-          <p:grpSpPr>
-            <a:xfrm>
-              <a:off x="2686800" y="19800"/>
-              <a:ext cx="3409200" cy="3409200"/>
-              <a:chOff x="875868" y="1724400"/>
-              <a:chExt cx="3409200" cy="3409200"/>
-            </a:xfrm>
-          </p:grpSpPr>
-          <p:pic>
-            <p:nvPicPr>
-              <p:cNvPr id="5" name="Picture 4" descr="A graph of a positive covid-19&#10;&#10;Description automatically generated">
-                <a:extLst>
-                  <a:ext uri="{FF2B5EF4-FFF2-40B4-BE49-F238E27FC236}">
-                    <a16:creationId xmlns:a16="http://schemas.microsoft.com/office/drawing/2014/main" id="{A0824DA6-5755-7AB3-D154-40AF2D73B353}"/>
-                  </a:ext>
-                </a:extLst>
-              </p:cNvPr>
-              <p:cNvPicPr>
-                <a:picLocks noChangeAspect="1"/>
-              </p:cNvPicPr>
-              <p:nvPr/>
-            </p:nvPicPr>
-            <p:blipFill>
-              <a:blip r:embed="rId2"/>
-              <a:stretch>
-                <a:fillRect/>
-              </a:stretch>
-            </p:blipFill>
-            <p:spPr>
-              <a:xfrm>
-                <a:off x="875868" y="1724400"/>
-                <a:ext cx="3409200" cy="3409200"/>
-              </a:xfrm>
-              <a:prstGeom prst="rect">
-                <a:avLst/>
-              </a:prstGeom>
-            </p:spPr>
-          </p:pic>
-          <p:sp>
-            <p:nvSpPr>
-              <p:cNvPr id="6" name="TextBox 5">
-                <a:extLst>
-                  <a:ext uri="{FF2B5EF4-FFF2-40B4-BE49-F238E27FC236}">
-                    <a16:creationId xmlns:a16="http://schemas.microsoft.com/office/drawing/2014/main" id="{FF9C547F-9FAC-6544-B52F-7B4CC7C04E66}"/>
-                  </a:ext>
-                </a:extLst>
-              </p:cNvPr>
-              <p:cNvSpPr txBox="1"/>
-              <p:nvPr/>
-            </p:nvSpPr>
-            <p:spPr>
-              <a:xfrm>
-                <a:off x="929432" y="1757008"/>
-                <a:ext cx="370614" cy="400110"/>
-              </a:xfrm>
-              <a:prstGeom prst="rect">
-                <a:avLst/>
-              </a:prstGeom>
-              <a:noFill/>
-            </p:spPr>
-            <p:txBody>
-              <a:bodyPr wrap="none" rtlCol="0">
-                <a:spAutoFit/>
-              </a:bodyPr>
-              <a:lstStyle/>
-              <a:p>
-                <a:r>
-                  <a:rPr lang="en-US" sz="2000" b="1" dirty="0">
-                    <a:latin typeface="Arial" panose="020B0604020202020204" pitchFamily="34" charset="0"/>
-                    <a:cs typeface="Arial" panose="020B0604020202020204" pitchFamily="34" charset="0"/>
-                  </a:rPr>
-                  <a:t>A</a:t>
-                </a:r>
-              </a:p>
-            </p:txBody>
-          </p:sp>
-        </p:grpSp>
-        <p:grpSp>
-          <p:nvGrpSpPr>
-            <p:cNvPr id="10" name="Group 9">
-              <a:extLst>
-                <a:ext uri="{FF2B5EF4-FFF2-40B4-BE49-F238E27FC236}">
-                  <a16:creationId xmlns:a16="http://schemas.microsoft.com/office/drawing/2014/main" id="{E12C9807-66E3-FD2E-0700-95AFB1DE7C96}"/>
-                </a:ext>
-              </a:extLst>
-            </p:cNvPr>
-            <p:cNvGrpSpPr/>
-            <p:nvPr/>
-          </p:nvGrpSpPr>
-          <p:grpSpPr>
-            <a:xfrm>
-              <a:off x="6096000" y="52408"/>
-              <a:ext cx="3409200" cy="3409200"/>
-              <a:chOff x="2601015" y="1377432"/>
-              <a:chExt cx="3409200" cy="3409200"/>
-            </a:xfrm>
-          </p:grpSpPr>
-          <p:pic>
-            <p:nvPicPr>
-              <p:cNvPr id="8" name="Picture 7" descr="A graph of a positive covid-19&#10;&#10;Description automatically generated">
-                <a:extLst>
-                  <a:ext uri="{FF2B5EF4-FFF2-40B4-BE49-F238E27FC236}">
-                    <a16:creationId xmlns:a16="http://schemas.microsoft.com/office/drawing/2014/main" id="{7C70BFFA-EB66-7809-AD84-6F55B4773A37}"/>
-                  </a:ext>
-                </a:extLst>
-              </p:cNvPr>
-              <p:cNvPicPr>
-                <a:picLocks noChangeAspect="1"/>
-              </p:cNvPicPr>
-              <p:nvPr/>
-            </p:nvPicPr>
-            <p:blipFill>
-              <a:blip r:embed="rId3"/>
-              <a:stretch>
-                <a:fillRect/>
-              </a:stretch>
-            </p:blipFill>
-            <p:spPr>
-              <a:xfrm>
-                <a:off x="2601015" y="1377432"/>
-                <a:ext cx="3409200" cy="3409200"/>
-              </a:xfrm>
-              <a:prstGeom prst="rect">
-                <a:avLst/>
-              </a:prstGeom>
-            </p:spPr>
-          </p:pic>
-          <p:sp>
-            <p:nvSpPr>
-              <p:cNvPr id="9" name="TextBox 8">
-                <a:extLst>
-                  <a:ext uri="{FF2B5EF4-FFF2-40B4-BE49-F238E27FC236}">
-                    <a16:creationId xmlns:a16="http://schemas.microsoft.com/office/drawing/2014/main" id="{307EB29A-34FF-FFD3-B998-A740E95893A7}"/>
-                  </a:ext>
-                </a:extLst>
-              </p:cNvPr>
-              <p:cNvSpPr txBox="1"/>
-              <p:nvPr/>
-            </p:nvSpPr>
-            <p:spPr>
-              <a:xfrm>
-                <a:off x="2629890" y="1377432"/>
-                <a:ext cx="370614" cy="400110"/>
-              </a:xfrm>
-              <a:prstGeom prst="rect">
-                <a:avLst/>
-              </a:prstGeom>
-              <a:noFill/>
-            </p:spPr>
-            <p:txBody>
-              <a:bodyPr wrap="none" rtlCol="0">
-                <a:spAutoFit/>
-              </a:bodyPr>
-              <a:lstStyle/>
-              <a:p>
-                <a:r>
-                  <a:rPr lang="en-US" sz="2000" b="1" dirty="0">
-                    <a:latin typeface="Arial" panose="020B0604020202020204" pitchFamily="34" charset="0"/>
-                    <a:cs typeface="Arial" panose="020B0604020202020204" pitchFamily="34" charset="0"/>
-                  </a:rPr>
-                  <a:t>B</a:t>
-                </a:r>
-              </a:p>
-            </p:txBody>
-          </p:sp>
-        </p:grpSp>
-        <p:grpSp>
-          <p:nvGrpSpPr>
-            <p:cNvPr id="13" name="Group 12">
-              <a:extLst>
-                <a:ext uri="{FF2B5EF4-FFF2-40B4-BE49-F238E27FC236}">
-                  <a16:creationId xmlns:a16="http://schemas.microsoft.com/office/drawing/2014/main" id="{3721C70C-705C-4C54-A774-496A50375053}"/>
-                </a:ext>
-              </a:extLst>
-            </p:cNvPr>
-            <p:cNvGrpSpPr/>
-            <p:nvPr/>
-          </p:nvGrpSpPr>
-          <p:grpSpPr>
-            <a:xfrm>
-              <a:off x="2686800" y="3461608"/>
-              <a:ext cx="3409200" cy="3409200"/>
-              <a:chOff x="8168383" y="2494421"/>
-              <a:chExt cx="3409200" cy="3409200"/>
-            </a:xfrm>
-          </p:grpSpPr>
-          <p:pic>
-            <p:nvPicPr>
-              <p:cNvPr id="11" name="Picture 10" descr="A graph of a positive rate&#10;&#10;Description automatically generated with medium confidence">
-                <a:extLst>
-                  <a:ext uri="{FF2B5EF4-FFF2-40B4-BE49-F238E27FC236}">
-                    <a16:creationId xmlns:a16="http://schemas.microsoft.com/office/drawing/2014/main" id="{D773B06F-918A-11D3-36F1-E85B377FD3C5}"/>
-                  </a:ext>
-                </a:extLst>
-              </p:cNvPr>
-              <p:cNvPicPr>
-                <a:picLocks noChangeAspect="1"/>
-              </p:cNvPicPr>
-              <p:nvPr/>
-            </p:nvPicPr>
-            <p:blipFill>
-              <a:blip r:embed="rId4"/>
-              <a:stretch>
-                <a:fillRect/>
-              </a:stretch>
-            </p:blipFill>
-            <p:spPr>
-              <a:xfrm>
-                <a:off x="8168383" y="2494421"/>
-                <a:ext cx="3409200" cy="3409200"/>
-              </a:xfrm>
-              <a:prstGeom prst="rect">
-                <a:avLst/>
-              </a:prstGeom>
-            </p:spPr>
-          </p:pic>
-          <p:sp>
-            <p:nvSpPr>
-              <p:cNvPr id="12" name="TextBox 11">
-                <a:extLst>
-                  <a:ext uri="{FF2B5EF4-FFF2-40B4-BE49-F238E27FC236}">
-                    <a16:creationId xmlns:a16="http://schemas.microsoft.com/office/drawing/2014/main" id="{423C27C3-78A0-EC72-BD35-CD0350117B26}"/>
-                  </a:ext>
-                </a:extLst>
-              </p:cNvPr>
-              <p:cNvSpPr txBox="1"/>
-              <p:nvPr/>
-            </p:nvSpPr>
-            <p:spPr>
-              <a:xfrm>
-                <a:off x="8211927" y="2494421"/>
-                <a:ext cx="370614" cy="400110"/>
-              </a:xfrm>
-              <a:prstGeom prst="rect">
-                <a:avLst/>
-              </a:prstGeom>
-              <a:noFill/>
-            </p:spPr>
-            <p:txBody>
-              <a:bodyPr wrap="none" rtlCol="0">
-                <a:spAutoFit/>
-              </a:bodyPr>
-              <a:lstStyle/>
-              <a:p>
-                <a:r>
-                  <a:rPr lang="en-US" sz="2000" b="1" dirty="0">
-                    <a:latin typeface="Arial" panose="020B0604020202020204" pitchFamily="34" charset="0"/>
-                    <a:cs typeface="Arial" panose="020B0604020202020204" pitchFamily="34" charset="0"/>
-                  </a:rPr>
-                  <a:t>C</a:t>
-                </a:r>
-              </a:p>
-            </p:txBody>
-          </p:sp>
-        </p:grpSp>
-        <p:grpSp>
-          <p:nvGrpSpPr>
-            <p:cNvPr id="17" name="Group 16">
-              <a:extLst>
-                <a:ext uri="{FF2B5EF4-FFF2-40B4-BE49-F238E27FC236}">
-                  <a16:creationId xmlns:a16="http://schemas.microsoft.com/office/drawing/2014/main" id="{A3B2FC9A-C505-CECC-E2ED-94195F6ECC81}"/>
-                </a:ext>
-              </a:extLst>
-            </p:cNvPr>
-            <p:cNvGrpSpPr/>
-            <p:nvPr/>
-          </p:nvGrpSpPr>
-          <p:grpSpPr>
-            <a:xfrm>
-              <a:off x="6124875" y="3461608"/>
-              <a:ext cx="3409200" cy="3409200"/>
-              <a:chOff x="6139544" y="3396392"/>
-              <a:chExt cx="3409200" cy="3409200"/>
-            </a:xfrm>
-          </p:grpSpPr>
-          <p:pic>
-            <p:nvPicPr>
-              <p:cNvPr id="15" name="Picture 14" descr="A graph of a positive rate&#10;&#10;Description automatically generated">
-                <a:extLst>
-                  <a:ext uri="{FF2B5EF4-FFF2-40B4-BE49-F238E27FC236}">
-                    <a16:creationId xmlns:a16="http://schemas.microsoft.com/office/drawing/2014/main" id="{3200E903-2B4E-9467-53AE-4FAA5C02B2BF}"/>
-                  </a:ext>
-                </a:extLst>
-              </p:cNvPr>
-              <p:cNvPicPr>
-                <a:picLocks noChangeAspect="1"/>
-              </p:cNvPicPr>
-              <p:nvPr/>
-            </p:nvPicPr>
-            <p:blipFill>
-              <a:blip r:embed="rId5"/>
-              <a:stretch>
-                <a:fillRect/>
-              </a:stretch>
-            </p:blipFill>
-            <p:spPr>
-              <a:xfrm>
-                <a:off x="6139544" y="3396392"/>
-                <a:ext cx="3409200" cy="3409200"/>
-              </a:xfrm>
-              <a:prstGeom prst="rect">
-                <a:avLst/>
-              </a:prstGeom>
-            </p:spPr>
-          </p:pic>
-          <p:sp>
-            <p:nvSpPr>
-              <p:cNvPr id="16" name="TextBox 15">
-                <a:extLst>
-                  <a:ext uri="{FF2B5EF4-FFF2-40B4-BE49-F238E27FC236}">
-                    <a16:creationId xmlns:a16="http://schemas.microsoft.com/office/drawing/2014/main" id="{6219116A-59B1-D3AC-CC69-C3F59B1913C6}"/>
-                  </a:ext>
-                </a:extLst>
-              </p:cNvPr>
-              <p:cNvSpPr txBox="1"/>
-              <p:nvPr/>
-            </p:nvSpPr>
-            <p:spPr>
-              <a:xfrm>
-                <a:off x="6184927" y="3429000"/>
-                <a:ext cx="370614" cy="400110"/>
-              </a:xfrm>
-              <a:prstGeom prst="rect">
-                <a:avLst/>
-              </a:prstGeom>
-              <a:noFill/>
-            </p:spPr>
-            <p:txBody>
-              <a:bodyPr wrap="none" rtlCol="0">
-                <a:spAutoFit/>
-              </a:bodyPr>
-              <a:lstStyle/>
-              <a:p>
-                <a:r>
-                  <a:rPr lang="en-US" sz="2000" b="1" dirty="0">
-                    <a:latin typeface="Arial" panose="020B0604020202020204" pitchFamily="34" charset="0"/>
-                    <a:cs typeface="Arial" panose="020B0604020202020204" pitchFamily="34" charset="0"/>
-                  </a:rPr>
-                  <a:t>D</a:t>
-                </a:r>
-              </a:p>
-            </p:txBody>
-          </p:sp>
-        </p:grpSp>
-      </p:grpSp>
+          <a:prstGeom prst="rect">
+            <a:avLst/>
+          </a:prstGeom>
+        </p:spPr>
+      </p:pic>
+      <p:pic>
+        <p:nvPicPr>
+          <p:cNvPr id="42" name="Picture 41" descr="A graph of a positive rate&#10;&#10;Description automatically generated">
+            <a:extLst>
+              <a:ext uri="{FF2B5EF4-FFF2-40B4-BE49-F238E27FC236}">
+                <a16:creationId xmlns:a16="http://schemas.microsoft.com/office/drawing/2014/main" id="{8DF166E7-ED85-008F-3603-058C2CE26B5C}"/>
+              </a:ext>
+            </a:extLst>
+          </p:cNvPr>
+          <p:cNvPicPr>
+            <a:picLocks noChangeAspect="1"/>
+          </p:cNvPicPr>
+          <p:nvPr/>
+        </p:nvPicPr>
+        <p:blipFill>
+          <a:blip r:embed="rId3"/>
+          <a:stretch>
+            <a:fillRect/>
+          </a:stretch>
+        </p:blipFill>
+        <p:spPr>
+          <a:xfrm>
+            <a:off x="5925000" y="3429000"/>
+            <a:ext cx="3600000" cy="3600000"/>
+          </a:xfrm>
+          <a:prstGeom prst="rect">
+            <a:avLst/>
+          </a:prstGeom>
+        </p:spPr>
+      </p:pic>
+      <p:pic>
+        <p:nvPicPr>
+          <p:cNvPr id="46" name="Picture 45" descr="A graph of a positive covid-19&#10;&#10;Description automatically generated">
+            <a:extLst>
+              <a:ext uri="{FF2B5EF4-FFF2-40B4-BE49-F238E27FC236}">
+                <a16:creationId xmlns:a16="http://schemas.microsoft.com/office/drawing/2014/main" id="{56F186C9-AF44-58CD-7C9E-1E5D461F1B51}"/>
+              </a:ext>
+            </a:extLst>
+          </p:cNvPr>
+          <p:cNvPicPr>
+            <a:picLocks noChangeAspect="1"/>
+          </p:cNvPicPr>
+          <p:nvPr/>
+        </p:nvPicPr>
+        <p:blipFill>
+          <a:blip r:embed="rId4"/>
+          <a:stretch>
+            <a:fillRect/>
+          </a:stretch>
+        </p:blipFill>
+        <p:spPr>
+          <a:xfrm>
+            <a:off x="2496000" y="0"/>
+            <a:ext cx="3600000" cy="3600000"/>
+          </a:xfrm>
+          <a:prstGeom prst="rect">
+            <a:avLst/>
+          </a:prstGeom>
+        </p:spPr>
+      </p:pic>
+      <p:pic>
+        <p:nvPicPr>
+          <p:cNvPr id="49" name="Picture 48" descr="A graph of a positive patient&#10;&#10;Description automatically generated with medium confidence">
+            <a:extLst>
+              <a:ext uri="{FF2B5EF4-FFF2-40B4-BE49-F238E27FC236}">
+                <a16:creationId xmlns:a16="http://schemas.microsoft.com/office/drawing/2014/main" id="{DF6FEC94-5DCF-0B20-1D80-E012DD1BAEB9}"/>
+              </a:ext>
+            </a:extLst>
+          </p:cNvPr>
+          <p:cNvPicPr>
+            <a:picLocks noChangeAspect="1"/>
+          </p:cNvPicPr>
+          <p:nvPr/>
+        </p:nvPicPr>
+        <p:blipFill>
+          <a:blip r:embed="rId5"/>
+          <a:stretch>
+            <a:fillRect/>
+          </a:stretch>
+        </p:blipFill>
+        <p:spPr>
+          <a:xfrm>
+            <a:off x="5925000" y="0"/>
+            <a:ext cx="3600000" cy="3600000"/>
+          </a:xfrm>
+          <a:prstGeom prst="rect">
+            <a:avLst/>
+          </a:prstGeom>
+        </p:spPr>
+      </p:pic>
     </p:spTree>
     <p:extLst>
       <p:ext uri="{BB962C8B-B14F-4D97-AF65-F5344CB8AC3E}">
@@ -10025,10 +9573,10 @@
       </p:grpSpPr>
       <p:grpSp>
         <p:nvGrpSpPr>
-          <p:cNvPr id="16" name="Group 15">
+          <p:cNvPr id="8" name="Group 7">
             <a:extLst>
               <a:ext uri="{FF2B5EF4-FFF2-40B4-BE49-F238E27FC236}">
-                <a16:creationId xmlns:a16="http://schemas.microsoft.com/office/drawing/2014/main" id="{EC3FE7B4-A5B2-6BA5-D837-BA0F553AFE28}"/>
+                <a16:creationId xmlns:a16="http://schemas.microsoft.com/office/drawing/2014/main" id="{BB560020-4AE1-1C24-5DC4-B638587A6378}"/>
               </a:ext>
             </a:extLst>
           </p:cNvPr>
@@ -10037,18 +9585,232 @@
         </p:nvGrpSpPr>
         <p:grpSpPr>
           <a:xfrm>
-            <a:off x="1126873" y="699881"/>
-            <a:ext cx="9632666" cy="5019619"/>
-            <a:chOff x="1126873" y="699881"/>
-            <a:chExt cx="9632666" cy="5019619"/>
+            <a:off x="1025429" y="699881"/>
+            <a:ext cx="10893556" cy="5019619"/>
+            <a:chOff x="1025429" y="699881"/>
+            <a:chExt cx="10893556" cy="5019619"/>
           </a:xfrm>
         </p:grpSpPr>
+        <p:grpSp>
+          <p:nvGrpSpPr>
+            <p:cNvPr id="5" name="Group 4">
+              <a:extLst>
+                <a:ext uri="{FF2B5EF4-FFF2-40B4-BE49-F238E27FC236}">
+                  <a16:creationId xmlns:a16="http://schemas.microsoft.com/office/drawing/2014/main" id="{4D636640-03CB-96A4-80D9-D8DF4ED133BE}"/>
+                </a:ext>
+              </a:extLst>
+            </p:cNvPr>
+            <p:cNvGrpSpPr/>
+            <p:nvPr/>
+          </p:nvGrpSpPr>
+          <p:grpSpPr>
+            <a:xfrm>
+              <a:off x="1025429" y="699881"/>
+              <a:ext cx="5748916" cy="5019619"/>
+              <a:chOff x="1025429" y="699881"/>
+              <a:chExt cx="5748916" cy="5019619"/>
+            </a:xfrm>
+          </p:grpSpPr>
+          <p:grpSp>
+            <p:nvGrpSpPr>
+              <p:cNvPr id="16" name="Group 15">
+                <a:extLst>
+                  <a:ext uri="{FF2B5EF4-FFF2-40B4-BE49-F238E27FC236}">
+                    <a16:creationId xmlns:a16="http://schemas.microsoft.com/office/drawing/2014/main" id="{EC3FE7B4-A5B2-6BA5-D837-BA0F553AFE28}"/>
+                  </a:ext>
+                </a:extLst>
+              </p:cNvPr>
+              <p:cNvGrpSpPr/>
+              <p:nvPr/>
+            </p:nvGrpSpPr>
+            <p:grpSpPr>
+              <a:xfrm>
+                <a:off x="1126873" y="699881"/>
+                <a:ext cx="5647472" cy="5019619"/>
+                <a:chOff x="1126873" y="699881"/>
+                <a:chExt cx="5647472" cy="5019619"/>
+              </a:xfrm>
+            </p:grpSpPr>
+            <p:pic>
+              <p:nvPicPr>
+                <p:cNvPr id="12" name="Picture 11" descr="A diagram of a diagram&#10;&#10;Description automatically generated with medium confidence">
+                  <a:extLst>
+                    <a:ext uri="{FF2B5EF4-FFF2-40B4-BE49-F238E27FC236}">
+                      <a16:creationId xmlns:a16="http://schemas.microsoft.com/office/drawing/2014/main" id="{44B49881-4D36-2029-39F5-B0889A5B6FF2}"/>
+                    </a:ext>
+                  </a:extLst>
+                </p:cNvPr>
+                <p:cNvPicPr>
+                  <a:picLocks noChangeAspect="1"/>
+                </p:cNvPicPr>
+                <p:nvPr/>
+              </p:nvPicPr>
+              <p:blipFill rotWithShape="1">
+                <a:blip r:embed="rId2"/>
+                <a:srcRect r="15165"/>
+                <a:stretch/>
+              </p:blipFill>
+              <p:spPr>
+                <a:xfrm>
+                  <a:off x="1126873" y="3429000"/>
+                  <a:ext cx="4663539" cy="2290500"/>
+                </a:xfrm>
+                <a:prstGeom prst="rect">
+                  <a:avLst/>
+                </a:prstGeom>
+              </p:spPr>
+            </p:pic>
+            <p:sp>
+              <p:nvSpPr>
+                <p:cNvPr id="13" name="TextBox 12">
+                  <a:extLst>
+                    <a:ext uri="{FF2B5EF4-FFF2-40B4-BE49-F238E27FC236}">
+                      <a16:creationId xmlns:a16="http://schemas.microsoft.com/office/drawing/2014/main" id="{235B475A-A503-5FBE-9A8A-82AD6DE261A5}"/>
+                    </a:ext>
+                  </a:extLst>
+                </p:cNvPr>
+                <p:cNvSpPr txBox="1"/>
+                <p:nvPr/>
+              </p:nvSpPr>
+              <p:spPr>
+                <a:xfrm>
+                  <a:off x="1477143" y="699881"/>
+                  <a:ext cx="327334" cy="400110"/>
+                </a:xfrm>
+                <a:prstGeom prst="rect">
+                  <a:avLst/>
+                </a:prstGeom>
+                <a:noFill/>
+              </p:spPr>
+              <p:txBody>
+                <a:bodyPr wrap="none" rtlCol="0">
+                  <a:spAutoFit/>
+                </a:bodyPr>
+                <a:lstStyle/>
+                <a:p>
+                  <a:r>
+                    <a:rPr lang="en-US" sz="2000" b="1" dirty="0">
+                      <a:latin typeface="Arial" panose="020B0604020202020204" pitchFamily="34" charset="0"/>
+                      <a:cs typeface="Arial" panose="020B0604020202020204" pitchFamily="34" charset="0"/>
+                    </a:rPr>
+                    <a:t>a</a:t>
+                  </a:r>
+                </a:p>
+              </p:txBody>
+            </p:sp>
+            <p:sp>
+              <p:nvSpPr>
+                <p:cNvPr id="14" name="TextBox 13">
+                  <a:extLst>
+                    <a:ext uri="{FF2B5EF4-FFF2-40B4-BE49-F238E27FC236}">
+                      <a16:creationId xmlns:a16="http://schemas.microsoft.com/office/drawing/2014/main" id="{06D240AE-DD12-09C9-1A4E-EA31B8C02963}"/>
+                    </a:ext>
+                  </a:extLst>
+                </p:cNvPr>
+                <p:cNvSpPr txBox="1"/>
+                <p:nvPr/>
+              </p:nvSpPr>
+              <p:spPr>
+                <a:xfrm>
+                  <a:off x="6432585" y="699881"/>
+                  <a:ext cx="341760" cy="400110"/>
+                </a:xfrm>
+                <a:prstGeom prst="rect">
+                  <a:avLst/>
+                </a:prstGeom>
+                <a:noFill/>
+              </p:spPr>
+              <p:txBody>
+                <a:bodyPr wrap="none" rtlCol="0">
+                  <a:spAutoFit/>
+                </a:bodyPr>
+                <a:lstStyle/>
+                <a:p>
+                  <a:r>
+                    <a:rPr lang="en-US" sz="2000" b="1" dirty="0">
+                      <a:latin typeface="Arial" panose="020B0604020202020204" pitchFamily="34" charset="0"/>
+                      <a:cs typeface="Arial" panose="020B0604020202020204" pitchFamily="34" charset="0"/>
+                    </a:rPr>
+                    <a:t>b</a:t>
+                  </a:r>
+                </a:p>
+              </p:txBody>
+            </p:sp>
+            <p:sp>
+              <p:nvSpPr>
+                <p:cNvPr id="15" name="TextBox 14">
+                  <a:extLst>
+                    <a:ext uri="{FF2B5EF4-FFF2-40B4-BE49-F238E27FC236}">
+                      <a16:creationId xmlns:a16="http://schemas.microsoft.com/office/drawing/2014/main" id="{6F5852A7-2794-5AC7-8DC2-32B1162CBBB1}"/>
+                    </a:ext>
+                  </a:extLst>
+                </p:cNvPr>
+                <p:cNvSpPr txBox="1"/>
+                <p:nvPr/>
+              </p:nvSpPr>
+              <p:spPr>
+                <a:xfrm>
+                  <a:off x="1476003" y="3228945"/>
+                  <a:ext cx="327334" cy="400110"/>
+                </a:xfrm>
+                <a:prstGeom prst="rect">
+                  <a:avLst/>
+                </a:prstGeom>
+                <a:noFill/>
+              </p:spPr>
+              <p:txBody>
+                <a:bodyPr wrap="none" rtlCol="0">
+                  <a:spAutoFit/>
+                </a:bodyPr>
+                <a:lstStyle/>
+                <a:p>
+                  <a:r>
+                    <a:rPr lang="en-US" sz="2000" b="1" dirty="0">
+                      <a:latin typeface="Arial" panose="020B0604020202020204" pitchFamily="34" charset="0"/>
+                      <a:cs typeface="Arial" panose="020B0604020202020204" pitchFamily="34" charset="0"/>
+                    </a:rPr>
+                    <a:t>c</a:t>
+                  </a:r>
+                </a:p>
+              </p:txBody>
+            </p:sp>
+          </p:grpSp>
+          <p:pic>
+            <p:nvPicPr>
+              <p:cNvPr id="3" name="Picture 2">
+                <a:extLst>
+                  <a:ext uri="{FF2B5EF4-FFF2-40B4-BE49-F238E27FC236}">
+                    <a16:creationId xmlns:a16="http://schemas.microsoft.com/office/drawing/2014/main" id="{C68D69E0-FCE8-5095-B8CB-A9E9A7CC4D60}"/>
+                  </a:ext>
+                </a:extLst>
+              </p:cNvPr>
+              <p:cNvPicPr>
+                <a:picLocks noChangeAspect="1"/>
+              </p:cNvPicPr>
+              <p:nvPr/>
+            </p:nvPicPr>
+            <p:blipFill rotWithShape="1">
+              <a:blip r:embed="rId3"/>
+              <a:srcRect r="7725"/>
+              <a:stretch/>
+            </p:blipFill>
+            <p:spPr>
+              <a:xfrm>
+                <a:off x="1025429" y="1019881"/>
+                <a:ext cx="5070571" cy="2289600"/>
+              </a:xfrm>
+              <a:prstGeom prst="rect">
+                <a:avLst/>
+              </a:prstGeom>
+            </p:spPr>
+          </p:pic>
+        </p:grpSp>
         <p:pic>
           <p:nvPicPr>
-            <p:cNvPr id="7" name="Picture 6" descr="A chart with different colored squares&#10;&#10;Description automatically generated">
+            <p:cNvPr id="6" name="Picture 5">
               <a:extLst>
                 <a:ext uri="{FF2B5EF4-FFF2-40B4-BE49-F238E27FC236}">
-                  <a16:creationId xmlns:a16="http://schemas.microsoft.com/office/drawing/2014/main" id="{C4D552C9-0FA0-7C33-9A8D-2676357F03DE}"/>
+                  <a16:creationId xmlns:a16="http://schemas.microsoft.com/office/drawing/2014/main" id="{CD0EC7D6-3976-3170-77C4-D7F00F611257}"/>
                 </a:ext>
               </a:extLst>
             </p:cNvPr>
@@ -10057,193 +9819,22 @@
             </p:cNvPicPr>
             <p:nvPr/>
           </p:nvPicPr>
-          <p:blipFill rotWithShape="1">
-            <a:blip r:embed="rId2"/>
-            <a:srcRect r="15148"/>
-            <a:stretch/>
+          <p:blipFill>
+            <a:blip r:embed="rId4"/>
+            <a:stretch>
+              <a:fillRect/>
+            </a:stretch>
           </p:blipFill>
           <p:spPr>
             <a:xfrm>
-              <a:off x="1126873" y="899936"/>
-              <a:ext cx="4663540" cy="2290026"/>
+              <a:off x="6432585" y="1023481"/>
+              <a:ext cx="5486400" cy="2286000"/>
             </a:xfrm>
             <a:prstGeom prst="rect">
               <a:avLst/>
             </a:prstGeom>
           </p:spPr>
         </p:pic>
-        <p:pic>
-          <p:nvPicPr>
-            <p:cNvPr id="9" name="Picture 8" descr="A graph of a diagram&#10;&#10;Description automatically generated with medium confidence">
-              <a:extLst>
-                <a:ext uri="{FF2B5EF4-FFF2-40B4-BE49-F238E27FC236}">
-                  <a16:creationId xmlns:a16="http://schemas.microsoft.com/office/drawing/2014/main" id="{1D82F435-6496-D0AE-8418-B773D55B060A}"/>
-                </a:ext>
-              </a:extLst>
-            </p:cNvPr>
-            <p:cNvPicPr>
-              <a:picLocks noChangeAspect="1"/>
-            </p:cNvPicPr>
-            <p:nvPr/>
-          </p:nvPicPr>
-          <p:blipFill rotWithShape="1">
-            <a:blip r:embed="rId3"/>
-            <a:srcRect r="15148"/>
-            <a:stretch/>
-          </p:blipFill>
-          <p:spPr>
-            <a:xfrm>
-              <a:off x="6096000" y="899936"/>
-              <a:ext cx="4663539" cy="2290026"/>
-            </a:xfrm>
-            <a:prstGeom prst="rect">
-              <a:avLst/>
-            </a:prstGeom>
-          </p:spPr>
-        </p:pic>
-        <p:pic>
-          <p:nvPicPr>
-            <p:cNvPr id="12" name="Picture 11" descr="A diagram of a diagram&#10;&#10;Description automatically generated with medium confidence">
-              <a:extLst>
-                <a:ext uri="{FF2B5EF4-FFF2-40B4-BE49-F238E27FC236}">
-                  <a16:creationId xmlns:a16="http://schemas.microsoft.com/office/drawing/2014/main" id="{44B49881-4D36-2029-39F5-B0889A5B6FF2}"/>
-                </a:ext>
-              </a:extLst>
-            </p:cNvPr>
-            <p:cNvPicPr>
-              <a:picLocks noChangeAspect="1"/>
-            </p:cNvPicPr>
-            <p:nvPr/>
-          </p:nvPicPr>
-          <p:blipFill rotWithShape="1">
-            <a:blip r:embed="rId4"/>
-            <a:srcRect r="15165"/>
-            <a:stretch/>
-          </p:blipFill>
-          <p:spPr>
-            <a:xfrm>
-              <a:off x="1126873" y="3429000"/>
-              <a:ext cx="4663539" cy="2290500"/>
-            </a:xfrm>
-            <a:prstGeom prst="rect">
-              <a:avLst/>
-            </a:prstGeom>
-          </p:spPr>
-        </p:pic>
-        <p:sp>
-          <p:nvSpPr>
-            <p:cNvPr id="13" name="TextBox 12">
-              <a:extLst>
-                <a:ext uri="{FF2B5EF4-FFF2-40B4-BE49-F238E27FC236}">
-                  <a16:creationId xmlns:a16="http://schemas.microsoft.com/office/drawing/2014/main" id="{235B475A-A503-5FBE-9A8A-82AD6DE261A5}"/>
-                </a:ext>
-              </a:extLst>
-            </p:cNvPr>
-            <p:cNvSpPr txBox="1"/>
-            <p:nvPr/>
-          </p:nvSpPr>
-          <p:spPr>
-            <a:xfrm>
-              <a:off x="1477143" y="699881"/>
-              <a:ext cx="370614" cy="400110"/>
-            </a:xfrm>
-            <a:prstGeom prst="rect">
-              <a:avLst/>
-            </a:prstGeom>
-            <a:noFill/>
-          </p:spPr>
-          <p:txBody>
-            <a:bodyPr wrap="none" rtlCol="0">
-              <a:spAutoFit/>
-            </a:bodyPr>
-            <a:lstStyle/>
-            <a:p>
-              <a:r>
-                <a:rPr lang="en-US" sz="2000" b="1" dirty="0">
-                  <a:latin typeface="Arial" panose="020B0604020202020204" pitchFamily="34" charset="0"/>
-                  <a:cs typeface="Arial" panose="020B0604020202020204" pitchFamily="34" charset="0"/>
-                </a:rPr>
-                <a:t>A</a:t>
-              </a:r>
-            </a:p>
-          </p:txBody>
-        </p:sp>
-        <p:sp>
-          <p:nvSpPr>
-            <p:cNvPr id="14" name="TextBox 13">
-              <a:extLst>
-                <a:ext uri="{FF2B5EF4-FFF2-40B4-BE49-F238E27FC236}">
-                  <a16:creationId xmlns:a16="http://schemas.microsoft.com/office/drawing/2014/main" id="{06D240AE-DD12-09C9-1A4E-EA31B8C02963}"/>
-                </a:ext>
-              </a:extLst>
-            </p:cNvPr>
-            <p:cNvSpPr txBox="1"/>
-            <p:nvPr/>
-          </p:nvSpPr>
-          <p:spPr>
-            <a:xfrm>
-              <a:off x="6432585" y="699881"/>
-              <a:ext cx="370614" cy="400110"/>
-            </a:xfrm>
-            <a:prstGeom prst="rect">
-              <a:avLst/>
-            </a:prstGeom>
-            <a:noFill/>
-          </p:spPr>
-          <p:txBody>
-            <a:bodyPr wrap="none" rtlCol="0">
-              <a:spAutoFit/>
-            </a:bodyPr>
-            <a:lstStyle/>
-            <a:p>
-              <a:r>
-                <a:rPr lang="en-US" sz="2000" b="1" dirty="0">
-                  <a:latin typeface="Arial" panose="020B0604020202020204" pitchFamily="34" charset="0"/>
-                  <a:cs typeface="Arial" panose="020B0604020202020204" pitchFamily="34" charset="0"/>
-                </a:rPr>
-                <a:t>B</a:t>
-              </a:r>
-            </a:p>
-          </p:txBody>
-        </p:sp>
-        <p:sp>
-          <p:nvSpPr>
-            <p:cNvPr id="15" name="TextBox 14">
-              <a:extLst>
-                <a:ext uri="{FF2B5EF4-FFF2-40B4-BE49-F238E27FC236}">
-                  <a16:creationId xmlns:a16="http://schemas.microsoft.com/office/drawing/2014/main" id="{6F5852A7-2794-5AC7-8DC2-32B1162CBBB1}"/>
-                </a:ext>
-              </a:extLst>
-            </p:cNvPr>
-            <p:cNvSpPr txBox="1"/>
-            <p:nvPr/>
-          </p:nvSpPr>
-          <p:spPr>
-            <a:xfrm>
-              <a:off x="1476003" y="3228945"/>
-              <a:ext cx="370614" cy="400110"/>
-            </a:xfrm>
-            <a:prstGeom prst="rect">
-              <a:avLst/>
-            </a:prstGeom>
-            <a:noFill/>
-          </p:spPr>
-          <p:txBody>
-            <a:bodyPr wrap="none" rtlCol="0">
-              <a:spAutoFit/>
-            </a:bodyPr>
-            <a:lstStyle/>
-            <a:p>
-              <a:r>
-                <a:rPr lang="en-US" sz="2000" b="1" dirty="0">
-                  <a:latin typeface="Arial" panose="020B0604020202020204" pitchFamily="34" charset="0"/>
-                  <a:cs typeface="Arial" panose="020B0604020202020204" pitchFamily="34" charset="0"/>
-                </a:rPr>
-                <a:t>C</a:t>
-              </a:r>
-            </a:p>
-          </p:txBody>
-        </p:sp>
       </p:grpSp>
     </p:spTree>
     <p:extLst>
@@ -10275,261 +9866,194 @@
           <a:chExt cx="0" cy="0"/>
         </a:xfrm>
       </p:grpSpPr>
-      <p:grpSp>
-        <p:nvGrpSpPr>
-          <p:cNvPr id="25" name="Group 24">
+      <p:sp>
+        <p:nvSpPr>
+          <p:cNvPr id="24" name="TextBox 23">
             <a:extLst>
               <a:ext uri="{FF2B5EF4-FFF2-40B4-BE49-F238E27FC236}">
-                <a16:creationId xmlns:a16="http://schemas.microsoft.com/office/drawing/2014/main" id="{187BBD15-4B01-1FC2-BE19-48EB4DD3EA24}"/>
+                <a16:creationId xmlns:a16="http://schemas.microsoft.com/office/drawing/2014/main" id="{90F66E11-E5F7-0151-ED99-B707E5EF3B12}"/>
               </a:ext>
             </a:extLst>
           </p:cNvPr>
-          <p:cNvGrpSpPr/>
+          <p:cNvSpPr txBox="1"/>
           <p:nvPr/>
-        </p:nvGrpSpPr>
-        <p:grpSpPr>
+        </p:nvSpPr>
+        <p:spPr>
           <a:xfrm>
-            <a:off x="1620982" y="1680051"/>
-            <a:ext cx="8763754" cy="3559890"/>
-            <a:chOff x="1620982" y="1680051"/>
-            <a:chExt cx="8763754" cy="3559890"/>
+            <a:off x="1738627" y="1680051"/>
+            <a:ext cx="327334" cy="400110"/>
           </a:xfrm>
-        </p:grpSpPr>
-        <p:pic>
-          <p:nvPicPr>
-            <p:cNvPr id="6" name="Picture 5" descr="A graph with different colored squares&#10;&#10;Description automatically generated">
-              <a:extLst>
-                <a:ext uri="{FF2B5EF4-FFF2-40B4-BE49-F238E27FC236}">
-                  <a16:creationId xmlns:a16="http://schemas.microsoft.com/office/drawing/2014/main" id="{4BB347F6-C138-9B3A-2419-58C18EFDDCBE}"/>
-                </a:ext>
-              </a:extLst>
-            </p:cNvPr>
-            <p:cNvPicPr>
-              <a:picLocks noChangeAspect="1"/>
-            </p:cNvPicPr>
-            <p:nvPr/>
-          </p:nvPicPr>
-          <p:blipFill>
-            <a:blip r:embed="rId2"/>
-            <a:stretch>
-              <a:fillRect/>
-            </a:stretch>
-          </p:blipFill>
-          <p:spPr>
-            <a:xfrm>
-              <a:off x="1620982" y="1950570"/>
-              <a:ext cx="3837600" cy="3289371"/>
-            </a:xfrm>
-            <a:prstGeom prst="rect">
-              <a:avLst/>
-            </a:prstGeom>
-          </p:spPr>
-        </p:pic>
-        <p:grpSp>
-          <p:nvGrpSpPr>
-            <p:cNvPr id="8" name="Group 7">
-              <a:extLst>
-                <a:ext uri="{FF2B5EF4-FFF2-40B4-BE49-F238E27FC236}">
-                  <a16:creationId xmlns:a16="http://schemas.microsoft.com/office/drawing/2014/main" id="{5102CE19-1171-41F8-A824-031DFADA3B38}"/>
-                </a:ext>
-              </a:extLst>
-            </p:cNvPr>
-            <p:cNvGrpSpPr/>
-            <p:nvPr/>
-          </p:nvGrpSpPr>
-          <p:grpSpPr>
-            <a:xfrm>
-              <a:off x="5586518" y="2073775"/>
-              <a:ext cx="4798218" cy="2474258"/>
-              <a:chOff x="605626" y="581978"/>
-              <a:chExt cx="4798218" cy="2474258"/>
-            </a:xfrm>
-          </p:grpSpPr>
-          <p:pic>
-            <p:nvPicPr>
-              <p:cNvPr id="9" name="Picture 8" descr="A graph with a line and a line&#10;&#10;Description automatically generated with medium confidence">
-                <a:extLst>
-                  <a:ext uri="{FF2B5EF4-FFF2-40B4-BE49-F238E27FC236}">
-                    <a16:creationId xmlns:a16="http://schemas.microsoft.com/office/drawing/2014/main" id="{9730D142-F433-E2E0-BB9A-9B87A2266E47}"/>
-                  </a:ext>
-                </a:extLst>
-              </p:cNvPr>
-              <p:cNvPicPr>
-                <a:picLocks noChangeAspect="1"/>
-              </p:cNvPicPr>
-              <p:nvPr/>
-            </p:nvPicPr>
-            <p:blipFill rotWithShape="1">
-              <a:blip r:embed="rId3"/>
-              <a:srcRect t="7270" b="5900"/>
-              <a:stretch/>
-            </p:blipFill>
-            <p:spPr>
-              <a:xfrm>
-                <a:off x="605626" y="581978"/>
-                <a:ext cx="906463" cy="2474258"/>
-              </a:xfrm>
-              <a:prstGeom prst="rect">
-                <a:avLst/>
-              </a:prstGeom>
-            </p:spPr>
-          </p:pic>
-          <p:pic>
-            <p:nvPicPr>
-              <p:cNvPr id="10" name="Picture 9" descr="A graph with a red square and black arrows&#10;&#10;Description automatically generated">
-                <a:extLst>
-                  <a:ext uri="{FF2B5EF4-FFF2-40B4-BE49-F238E27FC236}">
-                    <a16:creationId xmlns:a16="http://schemas.microsoft.com/office/drawing/2014/main" id="{1AE9C708-5CF5-9AC0-1214-8CC1F8ABBF47}"/>
-                  </a:ext>
-                </a:extLst>
-              </p:cNvPr>
-              <p:cNvPicPr>
-                <a:picLocks noChangeAspect="1"/>
-              </p:cNvPicPr>
-              <p:nvPr/>
-            </p:nvPicPr>
-            <p:blipFill rotWithShape="1">
-              <a:blip r:embed="rId4"/>
-              <a:srcRect t="7270" b="5900"/>
-              <a:stretch/>
-            </p:blipFill>
-            <p:spPr>
-              <a:xfrm>
-                <a:off x="1577969" y="581978"/>
-                <a:ext cx="906463" cy="2474258"/>
-              </a:xfrm>
-              <a:prstGeom prst="rect">
-                <a:avLst/>
-              </a:prstGeom>
-            </p:spPr>
-          </p:pic>
-          <p:pic>
-            <p:nvPicPr>
-              <p:cNvPr id="11" name="Picture 10" descr="A graph with numbers and lines&#10;&#10;Description automatically generated with medium confidence">
-                <a:extLst>
-                  <a:ext uri="{FF2B5EF4-FFF2-40B4-BE49-F238E27FC236}">
-                    <a16:creationId xmlns:a16="http://schemas.microsoft.com/office/drawing/2014/main" id="{AEBD151F-21C0-D45D-E657-5E46556CCA48}"/>
-                  </a:ext>
-                </a:extLst>
-              </p:cNvPr>
-              <p:cNvPicPr>
-                <a:picLocks noChangeAspect="1"/>
-              </p:cNvPicPr>
-              <p:nvPr/>
-            </p:nvPicPr>
-            <p:blipFill rotWithShape="1">
-              <a:blip r:embed="rId5"/>
-              <a:srcRect t="7270" b="5900"/>
-              <a:stretch/>
-            </p:blipFill>
-            <p:spPr>
-              <a:xfrm>
-                <a:off x="2551107" y="581978"/>
-                <a:ext cx="906463" cy="2474258"/>
-              </a:xfrm>
-              <a:prstGeom prst="rect">
-                <a:avLst/>
-              </a:prstGeom>
-            </p:spPr>
-          </p:pic>
-          <p:pic>
-            <p:nvPicPr>
-              <p:cNvPr id="12" name="Picture 11" descr="A graph of a number of objects&#10;&#10;Description automatically generated with medium confidence">
-                <a:extLst>
-                  <a:ext uri="{FF2B5EF4-FFF2-40B4-BE49-F238E27FC236}">
-                    <a16:creationId xmlns:a16="http://schemas.microsoft.com/office/drawing/2014/main" id="{87CA415C-C58B-44CB-5BC4-5EFBF04ABFAB}"/>
-                  </a:ext>
-                </a:extLst>
-              </p:cNvPr>
-              <p:cNvPicPr>
-                <a:picLocks noChangeAspect="1"/>
-              </p:cNvPicPr>
-              <p:nvPr/>
-            </p:nvPicPr>
-            <p:blipFill rotWithShape="1">
-              <a:blip r:embed="rId6"/>
-              <a:srcRect t="7270" b="5900"/>
-              <a:stretch/>
-            </p:blipFill>
-            <p:spPr>
-              <a:xfrm>
-                <a:off x="3524244" y="581978"/>
-                <a:ext cx="906463" cy="2474258"/>
-              </a:xfrm>
-              <a:prstGeom prst="rect">
-                <a:avLst/>
-              </a:prstGeom>
-            </p:spPr>
-          </p:pic>
-          <p:pic>
-            <p:nvPicPr>
-              <p:cNvPr id="13" name="Picture 12" descr="A graph showing a number of numbers&#10;&#10;Description automatically generated with medium confidence">
-                <a:extLst>
-                  <a:ext uri="{FF2B5EF4-FFF2-40B4-BE49-F238E27FC236}">
-                    <a16:creationId xmlns:a16="http://schemas.microsoft.com/office/drawing/2014/main" id="{2A6D769C-1EA5-A356-8498-B88E82151D23}"/>
-                  </a:ext>
-                </a:extLst>
-              </p:cNvPr>
-              <p:cNvPicPr>
-                <a:picLocks noChangeAspect="1"/>
-              </p:cNvPicPr>
-              <p:nvPr/>
-            </p:nvPicPr>
-            <p:blipFill rotWithShape="1">
-              <a:blip r:embed="rId7"/>
-              <a:srcRect t="7270" b="5900"/>
-              <a:stretch/>
-            </p:blipFill>
-            <p:spPr>
-              <a:xfrm>
-                <a:off x="4497381" y="581978"/>
-                <a:ext cx="906463" cy="2474258"/>
-              </a:xfrm>
-              <a:prstGeom prst="rect">
-                <a:avLst/>
-              </a:prstGeom>
-            </p:spPr>
-          </p:pic>
-        </p:grpSp>
-        <p:sp>
-          <p:nvSpPr>
-            <p:cNvPr id="24" name="TextBox 23">
-              <a:extLst>
-                <a:ext uri="{FF2B5EF4-FFF2-40B4-BE49-F238E27FC236}">
-                  <a16:creationId xmlns:a16="http://schemas.microsoft.com/office/drawing/2014/main" id="{90F66E11-E5F7-0151-ED99-B707E5EF3B12}"/>
-                </a:ext>
-              </a:extLst>
-            </p:cNvPr>
-            <p:cNvSpPr txBox="1"/>
-            <p:nvPr/>
-          </p:nvSpPr>
-          <p:spPr>
-            <a:xfrm>
-              <a:off x="1738627" y="1680051"/>
-              <a:ext cx="370614" cy="400110"/>
-            </a:xfrm>
-            <a:prstGeom prst="rect">
-              <a:avLst/>
-            </a:prstGeom>
-            <a:noFill/>
-          </p:spPr>
-          <p:txBody>
-            <a:bodyPr wrap="none" rtlCol="0">
-              <a:spAutoFit/>
-            </a:bodyPr>
-            <a:lstStyle/>
-            <a:p>
-              <a:r>
-                <a:rPr lang="en-US" sz="2000" b="1" dirty="0">
-                  <a:latin typeface="Arial" panose="020B0604020202020204" pitchFamily="34" charset="0"/>
-                  <a:cs typeface="Arial" panose="020B0604020202020204" pitchFamily="34" charset="0"/>
-                </a:rPr>
-                <a:t>A</a:t>
-              </a:r>
-            </a:p>
-          </p:txBody>
-        </p:sp>
-      </p:grpSp>
+          <a:prstGeom prst="rect">
+            <a:avLst/>
+          </a:prstGeom>
+          <a:noFill/>
+        </p:spPr>
+        <p:txBody>
+          <a:bodyPr wrap="none" rtlCol="0">
+            <a:spAutoFit/>
+          </a:bodyPr>
+          <a:lstStyle/>
+          <a:p>
+            <a:r>
+              <a:rPr lang="en-US" sz="2000" b="1" dirty="0">
+                <a:latin typeface="Arial" panose="020B0604020202020204" pitchFamily="34" charset="0"/>
+                <a:cs typeface="Arial" panose="020B0604020202020204" pitchFamily="34" charset="0"/>
+              </a:rPr>
+              <a:t>a</a:t>
+            </a:r>
+          </a:p>
+        </p:txBody>
+      </p:sp>
+      <p:pic>
+        <p:nvPicPr>
+          <p:cNvPr id="3" name="Picture 2" descr="A graph of different colored squares&#10;&#10;Description automatically generated">
+            <a:extLst>
+              <a:ext uri="{FF2B5EF4-FFF2-40B4-BE49-F238E27FC236}">
+                <a16:creationId xmlns:a16="http://schemas.microsoft.com/office/drawing/2014/main" id="{86AA35B5-5D4F-C642-1237-FF6DFEAE3932}"/>
+              </a:ext>
+            </a:extLst>
+          </p:cNvPr>
+          <p:cNvPicPr>
+            <a:picLocks noChangeAspect="1"/>
+          </p:cNvPicPr>
+          <p:nvPr/>
+        </p:nvPicPr>
+        <p:blipFill>
+          <a:blip r:embed="rId2"/>
+          <a:stretch>
+            <a:fillRect/>
+          </a:stretch>
+        </p:blipFill>
+        <p:spPr>
+          <a:xfrm>
+            <a:off x="1681043" y="2004201"/>
+            <a:ext cx="3838800" cy="3290400"/>
+          </a:xfrm>
+          <a:prstGeom prst="rect">
+            <a:avLst/>
+          </a:prstGeom>
+        </p:spPr>
+      </p:pic>
+      <p:pic>
+        <p:nvPicPr>
+          <p:cNvPr id="5" name="Picture 4" descr="A graph with a number of squares&#10;&#10;Description automatically generated with medium confidence">
+            <a:extLst>
+              <a:ext uri="{FF2B5EF4-FFF2-40B4-BE49-F238E27FC236}">
+                <a16:creationId xmlns:a16="http://schemas.microsoft.com/office/drawing/2014/main" id="{E9086A34-0151-6EFD-E04D-D95194A4BF75}"/>
+              </a:ext>
+            </a:extLst>
+          </p:cNvPr>
+          <p:cNvPicPr>
+            <a:picLocks noChangeAspect="1"/>
+          </p:cNvPicPr>
+          <p:nvPr/>
+        </p:nvPicPr>
+        <p:blipFill>
+          <a:blip r:embed="rId3"/>
+          <a:stretch>
+            <a:fillRect/>
+          </a:stretch>
+        </p:blipFill>
+        <p:spPr>
+          <a:xfrm>
+            <a:off x="6354793" y="2038045"/>
+            <a:ext cx="840000" cy="2520000"/>
+          </a:xfrm>
+          <a:prstGeom prst="rect">
+            <a:avLst/>
+          </a:prstGeom>
+        </p:spPr>
+      </p:pic>
+      <p:pic>
+        <p:nvPicPr>
+          <p:cNvPr id="14" name="Picture 13" descr="A graph with a rectangular object&#10;&#10;Description automatically generated with medium confidence">
+            <a:extLst>
+              <a:ext uri="{FF2B5EF4-FFF2-40B4-BE49-F238E27FC236}">
+                <a16:creationId xmlns:a16="http://schemas.microsoft.com/office/drawing/2014/main" id="{0B6E36DF-ACBD-7B31-3B7F-E10D878B003E}"/>
+              </a:ext>
+            </a:extLst>
+          </p:cNvPr>
+          <p:cNvPicPr>
+            <a:picLocks noChangeAspect="1"/>
+          </p:cNvPicPr>
+          <p:nvPr/>
+        </p:nvPicPr>
+        <p:blipFill>
+          <a:blip r:embed="rId4"/>
+          <a:stretch>
+            <a:fillRect/>
+          </a:stretch>
+        </p:blipFill>
+        <p:spPr>
+          <a:xfrm>
+            <a:off x="5448119" y="2034445"/>
+            <a:ext cx="841200" cy="2523600"/>
+          </a:xfrm>
+          <a:prstGeom prst="rect">
+            <a:avLst/>
+          </a:prstGeom>
+        </p:spPr>
+      </p:pic>
+      <p:pic>
+        <p:nvPicPr>
+          <p:cNvPr id="16" name="Picture 15" descr="A graph with a red square and black lines&#10;&#10;Description automatically generated with medium confidence">
+            <a:extLst>
+              <a:ext uri="{FF2B5EF4-FFF2-40B4-BE49-F238E27FC236}">
+                <a16:creationId xmlns:a16="http://schemas.microsoft.com/office/drawing/2014/main" id="{7D9D47C6-E86E-92A7-B2BE-7D9611A08173}"/>
+              </a:ext>
+            </a:extLst>
+          </p:cNvPr>
+          <p:cNvPicPr>
+            <a:picLocks noChangeAspect="1"/>
+          </p:cNvPicPr>
+          <p:nvPr/>
+        </p:nvPicPr>
+        <p:blipFill>
+          <a:blip r:embed="rId5"/>
+          <a:stretch>
+            <a:fillRect/>
+          </a:stretch>
+        </p:blipFill>
+        <p:spPr>
+          <a:xfrm>
+            <a:off x="7260267" y="2034445"/>
+            <a:ext cx="841200" cy="2523600"/>
+          </a:xfrm>
+          <a:prstGeom prst="rect">
+            <a:avLst/>
+          </a:prstGeom>
+        </p:spPr>
+      </p:pic>
+      <p:pic>
+        <p:nvPicPr>
+          <p:cNvPr id="18" name="Picture 17" descr="A screenshot of a graph&#10;&#10;Description automatically generated">
+            <a:extLst>
+              <a:ext uri="{FF2B5EF4-FFF2-40B4-BE49-F238E27FC236}">
+                <a16:creationId xmlns:a16="http://schemas.microsoft.com/office/drawing/2014/main" id="{15F71D90-00D1-446C-8102-93B1FA033F50}"/>
+              </a:ext>
+            </a:extLst>
+          </p:cNvPr>
+          <p:cNvPicPr>
+            <a:picLocks noChangeAspect="1"/>
+          </p:cNvPicPr>
+          <p:nvPr/>
+        </p:nvPicPr>
+        <p:blipFill>
+          <a:blip r:embed="rId6"/>
+          <a:stretch>
+            <a:fillRect/>
+          </a:stretch>
+        </p:blipFill>
+        <p:spPr>
+          <a:xfrm>
+            <a:off x="8165741" y="2034445"/>
+            <a:ext cx="841200" cy="2523600"/>
+          </a:xfrm>
+          <a:prstGeom prst="rect">
+            <a:avLst/>
+          </a:prstGeom>
+        </p:spPr>
+      </p:pic>
     </p:spTree>
     <p:extLst>
       <p:ext uri="{BB962C8B-B14F-4D97-AF65-F5344CB8AC3E}">
@@ -10560,266 +10084,164 @@
           <a:chExt cx="0" cy="0"/>
         </a:xfrm>
       </p:grpSpPr>
-      <p:grpSp>
-        <p:nvGrpSpPr>
-          <p:cNvPr id="12" name="Group 11">
+      <p:sp>
+        <p:nvSpPr>
+          <p:cNvPr id="11" name="TextBox 10">
             <a:extLst>
               <a:ext uri="{FF2B5EF4-FFF2-40B4-BE49-F238E27FC236}">
-                <a16:creationId xmlns:a16="http://schemas.microsoft.com/office/drawing/2014/main" id="{AB9D372D-6549-A856-A138-60278003ED75}"/>
+                <a16:creationId xmlns:a16="http://schemas.microsoft.com/office/drawing/2014/main" id="{001CC932-CF8E-48B9-0ABB-666342F01DCA}"/>
               </a:ext>
             </a:extLst>
           </p:cNvPr>
-          <p:cNvGrpSpPr/>
+          <p:cNvSpPr txBox="1"/>
           <p:nvPr/>
-        </p:nvGrpSpPr>
-        <p:grpSpPr>
+        </p:nvSpPr>
+        <p:spPr>
           <a:xfrm>
-            <a:off x="1625351" y="1680051"/>
-            <a:ext cx="8763754" cy="3584154"/>
-            <a:chOff x="1625351" y="1680051"/>
-            <a:chExt cx="8763754" cy="3584154"/>
+            <a:off x="1738627" y="1680051"/>
+            <a:ext cx="341760" cy="400110"/>
           </a:xfrm>
-        </p:grpSpPr>
-        <p:pic>
-          <p:nvPicPr>
-            <p:cNvPr id="4" name="Picture 3" descr="A graph with blue and pink squares&#10;&#10;Description automatically generated">
-              <a:extLst>
-                <a:ext uri="{FF2B5EF4-FFF2-40B4-BE49-F238E27FC236}">
-                  <a16:creationId xmlns:a16="http://schemas.microsoft.com/office/drawing/2014/main" id="{1F9DEAA6-77BB-020A-96F3-3476A8D9029C}"/>
-                </a:ext>
-              </a:extLst>
-            </p:cNvPr>
-            <p:cNvPicPr>
-              <a:picLocks noChangeAspect="1"/>
-            </p:cNvPicPr>
-            <p:nvPr/>
-          </p:nvPicPr>
-          <p:blipFill>
-            <a:blip r:embed="rId2"/>
-            <a:stretch>
-              <a:fillRect/>
-            </a:stretch>
-          </p:blipFill>
-          <p:spPr>
-            <a:xfrm>
-              <a:off x="1625351" y="1974834"/>
-              <a:ext cx="3837600" cy="3289371"/>
-            </a:xfrm>
-            <a:prstGeom prst="rect">
-              <a:avLst/>
-            </a:prstGeom>
-          </p:spPr>
-        </p:pic>
-        <p:grpSp>
-          <p:nvGrpSpPr>
-            <p:cNvPr id="5" name="Group 4">
-              <a:extLst>
-                <a:ext uri="{FF2B5EF4-FFF2-40B4-BE49-F238E27FC236}">
-                  <a16:creationId xmlns:a16="http://schemas.microsoft.com/office/drawing/2014/main" id="{DE5158E6-C41E-644E-9EC1-A739A953FAD8}"/>
-                </a:ext>
-              </a:extLst>
-            </p:cNvPr>
-            <p:cNvGrpSpPr/>
-            <p:nvPr/>
-          </p:nvGrpSpPr>
-          <p:grpSpPr>
-            <a:xfrm>
-              <a:off x="5591679" y="1867626"/>
-              <a:ext cx="4797426" cy="2864534"/>
-              <a:chOff x="6707791" y="359824"/>
-              <a:chExt cx="4797426" cy="2864534"/>
-            </a:xfrm>
-          </p:grpSpPr>
-          <p:pic>
-            <p:nvPicPr>
-              <p:cNvPr id="6" name="Picture 5" descr="A graph with a line and a line&#10;&#10;Description automatically generated with medium confidence">
-                <a:extLst>
-                  <a:ext uri="{FF2B5EF4-FFF2-40B4-BE49-F238E27FC236}">
-                    <a16:creationId xmlns:a16="http://schemas.microsoft.com/office/drawing/2014/main" id="{6B86DEFC-13F9-BB7B-0E50-26B9E9465B09}"/>
-                  </a:ext>
-                </a:extLst>
-              </p:cNvPr>
-              <p:cNvPicPr>
-                <a:picLocks noChangeAspect="1"/>
-              </p:cNvPicPr>
-              <p:nvPr/>
-            </p:nvPicPr>
-            <p:blipFill>
-              <a:blip r:embed="rId3"/>
-              <a:stretch>
-                <a:fillRect/>
-              </a:stretch>
-            </p:blipFill>
-            <p:spPr>
-              <a:xfrm>
-                <a:off x="6707791" y="359824"/>
-                <a:ext cx="906463" cy="2849563"/>
-              </a:xfrm>
-              <a:prstGeom prst="rect">
-                <a:avLst/>
-              </a:prstGeom>
-            </p:spPr>
-          </p:pic>
-          <p:pic>
-            <p:nvPicPr>
-              <p:cNvPr id="7" name="Picture 6" descr="A graph with a red square and black lines&#10;&#10;Description automatically generated">
-                <a:extLst>
-                  <a:ext uri="{FF2B5EF4-FFF2-40B4-BE49-F238E27FC236}">
-                    <a16:creationId xmlns:a16="http://schemas.microsoft.com/office/drawing/2014/main" id="{992A19CE-37E6-B24D-E9BA-43380BF51885}"/>
-                  </a:ext>
-                </a:extLst>
-              </p:cNvPr>
-              <p:cNvPicPr>
-                <a:picLocks noChangeAspect="1"/>
-              </p:cNvPicPr>
-              <p:nvPr/>
-            </p:nvPicPr>
-            <p:blipFill>
-              <a:blip r:embed="rId4"/>
-              <a:stretch>
-                <a:fillRect/>
-              </a:stretch>
-            </p:blipFill>
-            <p:spPr>
-              <a:xfrm>
-                <a:off x="7680929" y="374795"/>
-                <a:ext cx="906463" cy="2849563"/>
-              </a:xfrm>
-              <a:prstGeom prst="rect">
-                <a:avLst/>
-              </a:prstGeom>
-            </p:spPr>
-          </p:pic>
-          <p:pic>
-            <p:nvPicPr>
-              <p:cNvPr id="8" name="Picture 7" descr="A graph of a number of points&#10;&#10;Description automatically generated with medium confidence">
-                <a:extLst>
-                  <a:ext uri="{FF2B5EF4-FFF2-40B4-BE49-F238E27FC236}">
-                    <a16:creationId xmlns:a16="http://schemas.microsoft.com/office/drawing/2014/main" id="{E41C3325-CA0C-7815-76F3-FECA45DE34F4}"/>
-                  </a:ext>
-                </a:extLst>
-              </p:cNvPr>
-              <p:cNvPicPr>
-                <a:picLocks noChangeAspect="1"/>
-              </p:cNvPicPr>
-              <p:nvPr/>
-            </p:nvPicPr>
-            <p:blipFill>
-              <a:blip r:embed="rId5"/>
-              <a:stretch>
-                <a:fillRect/>
-              </a:stretch>
-            </p:blipFill>
-            <p:spPr>
-              <a:xfrm>
-                <a:off x="8654066" y="374795"/>
-                <a:ext cx="906463" cy="2849563"/>
-              </a:xfrm>
-              <a:prstGeom prst="rect">
-                <a:avLst/>
-              </a:prstGeom>
-            </p:spPr>
-          </p:pic>
-          <p:pic>
-            <p:nvPicPr>
-              <p:cNvPr id="9" name="Picture 8" descr="A graph showing a number of data&#10;&#10;Description automatically generated with medium confidence">
-                <a:extLst>
-                  <a:ext uri="{FF2B5EF4-FFF2-40B4-BE49-F238E27FC236}">
-                    <a16:creationId xmlns:a16="http://schemas.microsoft.com/office/drawing/2014/main" id="{AD15F5E0-15AA-0758-3069-FB8F36ED597B}"/>
-                  </a:ext>
-                </a:extLst>
-              </p:cNvPr>
-              <p:cNvPicPr>
-                <a:picLocks noChangeAspect="1"/>
-              </p:cNvPicPr>
-              <p:nvPr/>
-            </p:nvPicPr>
-            <p:blipFill>
-              <a:blip r:embed="rId6"/>
-              <a:stretch>
-                <a:fillRect/>
-              </a:stretch>
-            </p:blipFill>
-            <p:spPr>
-              <a:xfrm>
-                <a:off x="9626410" y="374795"/>
-                <a:ext cx="906463" cy="2849563"/>
-              </a:xfrm>
-              <a:prstGeom prst="rect">
-                <a:avLst/>
-              </a:prstGeom>
-            </p:spPr>
-          </p:pic>
-          <p:pic>
-            <p:nvPicPr>
-              <p:cNvPr id="10" name="Picture 9" descr="A graph with a red square and black lines&#10;&#10;Description automatically generated">
-                <a:extLst>
-                  <a:ext uri="{FF2B5EF4-FFF2-40B4-BE49-F238E27FC236}">
-                    <a16:creationId xmlns:a16="http://schemas.microsoft.com/office/drawing/2014/main" id="{34B71A1E-A22D-1987-4D75-B51A3CFD43AE}"/>
-                  </a:ext>
-                </a:extLst>
-              </p:cNvPr>
-              <p:cNvPicPr>
-                <a:picLocks noChangeAspect="1"/>
-              </p:cNvPicPr>
-              <p:nvPr/>
-            </p:nvPicPr>
-            <p:blipFill>
-              <a:blip r:embed="rId7"/>
-              <a:stretch>
-                <a:fillRect/>
-              </a:stretch>
-            </p:blipFill>
-            <p:spPr>
-              <a:xfrm>
-                <a:off x="10598754" y="374795"/>
-                <a:ext cx="906463" cy="2849563"/>
-              </a:xfrm>
-              <a:prstGeom prst="rect">
-                <a:avLst/>
-              </a:prstGeom>
-            </p:spPr>
-          </p:pic>
-        </p:grpSp>
-        <p:sp>
-          <p:nvSpPr>
-            <p:cNvPr id="11" name="TextBox 10">
-              <a:extLst>
-                <a:ext uri="{FF2B5EF4-FFF2-40B4-BE49-F238E27FC236}">
-                  <a16:creationId xmlns:a16="http://schemas.microsoft.com/office/drawing/2014/main" id="{001CC932-CF8E-48B9-0ABB-666342F01DCA}"/>
-                </a:ext>
-              </a:extLst>
-            </p:cNvPr>
-            <p:cNvSpPr txBox="1"/>
-            <p:nvPr/>
-          </p:nvSpPr>
-          <p:spPr>
-            <a:xfrm>
-              <a:off x="1738627" y="1680051"/>
-              <a:ext cx="370614" cy="400110"/>
-            </a:xfrm>
-            <a:prstGeom prst="rect">
-              <a:avLst/>
-            </a:prstGeom>
-            <a:noFill/>
-          </p:spPr>
-          <p:txBody>
-            <a:bodyPr wrap="none" rtlCol="0">
-              <a:spAutoFit/>
-            </a:bodyPr>
-            <a:lstStyle/>
-            <a:p>
-              <a:r>
-                <a:rPr lang="en-US" sz="2000" b="1" dirty="0">
-                  <a:latin typeface="Arial" panose="020B0604020202020204" pitchFamily="34" charset="0"/>
-                  <a:cs typeface="Arial" panose="020B0604020202020204" pitchFamily="34" charset="0"/>
-                </a:rPr>
-                <a:t>B</a:t>
-              </a:r>
-            </a:p>
-          </p:txBody>
-        </p:sp>
-      </p:grpSp>
+          <a:prstGeom prst="rect">
+            <a:avLst/>
+          </a:prstGeom>
+          <a:noFill/>
+        </p:spPr>
+        <p:txBody>
+          <a:bodyPr wrap="none" rtlCol="0">
+            <a:spAutoFit/>
+          </a:bodyPr>
+          <a:lstStyle/>
+          <a:p>
+            <a:r>
+              <a:rPr lang="en-US" sz="2000" b="1" dirty="0">
+                <a:latin typeface="Arial" panose="020B0604020202020204" pitchFamily="34" charset="0"/>
+                <a:cs typeface="Arial" panose="020B0604020202020204" pitchFamily="34" charset="0"/>
+              </a:rPr>
+              <a:t>b</a:t>
+            </a:r>
+          </a:p>
+        </p:txBody>
+      </p:sp>
+      <p:pic>
+        <p:nvPicPr>
+          <p:cNvPr id="17" name="Picture 16" descr="A graph of a diagram&#10;&#10;Description automatically generated with medium confidence">
+            <a:extLst>
+              <a:ext uri="{FF2B5EF4-FFF2-40B4-BE49-F238E27FC236}">
+                <a16:creationId xmlns:a16="http://schemas.microsoft.com/office/drawing/2014/main" id="{2C61B569-CF6C-209B-F83F-E430C11F5BAC}"/>
+              </a:ext>
+            </a:extLst>
+          </p:cNvPr>
+          <p:cNvPicPr>
+            <a:picLocks noChangeAspect="1"/>
+          </p:cNvPicPr>
+          <p:nvPr/>
+        </p:nvPicPr>
+        <p:blipFill>
+          <a:blip r:embed="rId2"/>
+          <a:stretch>
+            <a:fillRect/>
+          </a:stretch>
+        </p:blipFill>
+        <p:spPr>
+          <a:xfrm>
+            <a:off x="1686204" y="2006817"/>
+            <a:ext cx="3838800" cy="3290400"/>
+          </a:xfrm>
+          <a:prstGeom prst="rect">
+            <a:avLst/>
+          </a:prstGeom>
+        </p:spPr>
+      </p:pic>
+      <p:pic>
+        <p:nvPicPr>
+          <p:cNvPr id="19" name="Picture 18" descr="A screenshot of a graph&#10;&#10;Description automatically generated">
+            <a:extLst>
+              <a:ext uri="{FF2B5EF4-FFF2-40B4-BE49-F238E27FC236}">
+                <a16:creationId xmlns:a16="http://schemas.microsoft.com/office/drawing/2014/main" id="{48952F40-4EBD-F157-2080-96739DED3834}"/>
+              </a:ext>
+            </a:extLst>
+          </p:cNvPr>
+          <p:cNvPicPr>
+            <a:picLocks noChangeAspect="1"/>
+          </p:cNvPicPr>
+          <p:nvPr/>
+        </p:nvPicPr>
+        <p:blipFill>
+          <a:blip r:embed="rId3"/>
+          <a:stretch>
+            <a:fillRect/>
+          </a:stretch>
+        </p:blipFill>
+        <p:spPr>
+          <a:xfrm>
+            <a:off x="7247071" y="2044065"/>
+            <a:ext cx="840000" cy="2520000"/>
+          </a:xfrm>
+          <a:prstGeom prst="rect">
+            <a:avLst/>
+          </a:prstGeom>
+        </p:spPr>
+      </p:pic>
+      <p:pic>
+        <p:nvPicPr>
+          <p:cNvPr id="26" name="Picture 25" descr="A graph with a number of squares and lines&#10;&#10;Description automatically generated with medium confidence">
+            <a:extLst>
+              <a:ext uri="{FF2B5EF4-FFF2-40B4-BE49-F238E27FC236}">
+                <a16:creationId xmlns:a16="http://schemas.microsoft.com/office/drawing/2014/main" id="{13FAAE8D-5B34-A703-FAF3-47D0FC2E7943}"/>
+              </a:ext>
+            </a:extLst>
+          </p:cNvPr>
+          <p:cNvPicPr>
+            <a:picLocks noChangeAspect="1"/>
+          </p:cNvPicPr>
+          <p:nvPr/>
+        </p:nvPicPr>
+        <p:blipFill>
+          <a:blip r:embed="rId4"/>
+          <a:stretch>
+            <a:fillRect/>
+          </a:stretch>
+        </p:blipFill>
+        <p:spPr>
+          <a:xfrm>
+            <a:off x="6358105" y="2044065"/>
+            <a:ext cx="840000" cy="2520000"/>
+          </a:xfrm>
+          <a:prstGeom prst="rect">
+            <a:avLst/>
+          </a:prstGeom>
+        </p:spPr>
+      </p:pic>
+      <p:pic>
+        <p:nvPicPr>
+          <p:cNvPr id="27" name="Picture 26" descr="A graph with a red rectangular object&#10;&#10;Description automatically generated with medium confidence">
+            <a:extLst>
+              <a:ext uri="{FF2B5EF4-FFF2-40B4-BE49-F238E27FC236}">
+                <a16:creationId xmlns:a16="http://schemas.microsoft.com/office/drawing/2014/main" id="{499F5CE1-DA70-E177-2C92-6A104F24DA7F}"/>
+              </a:ext>
+            </a:extLst>
+          </p:cNvPr>
+          <p:cNvPicPr>
+            <a:picLocks noChangeAspect="1"/>
+          </p:cNvPicPr>
+          <p:nvPr/>
+        </p:nvPicPr>
+        <p:blipFill>
+          <a:blip r:embed="rId5"/>
+          <a:stretch>
+            <a:fillRect/>
+          </a:stretch>
+        </p:blipFill>
+        <p:spPr>
+          <a:xfrm>
+            <a:off x="5469139" y="2044065"/>
+            <a:ext cx="840000" cy="2520000"/>
+          </a:xfrm>
+          <a:prstGeom prst="rect">
+            <a:avLst/>
+          </a:prstGeom>
+        </p:spPr>
+      </p:pic>
     </p:spTree>
     <p:extLst>
       <p:ext uri="{BB962C8B-B14F-4D97-AF65-F5344CB8AC3E}">

</xml_diff>